<commit_message>
update the attack demo section 3 and 4.
</commit_message>
<xml_diff>
--- a/5_Case_Study_Doc/2_CaseStudy_MITM_Img/designDoc.pptx
+++ b/5_Case_Study_Doc/2_CaseStudy_MITM_Img/designDoc.pptx
@@ -5,11 +5,12 @@
     <p:sldMasterId id="2147483648" r:id="rId1"/>
   </p:sldMasterIdLst>
   <p:notesMasterIdLst>
-    <p:notesMasterId r:id="rId4"/>
+    <p:notesMasterId r:id="rId5"/>
   </p:notesMasterIdLst>
   <p:sldIdLst>
     <p:sldId id="272" r:id="rId2"/>
     <p:sldId id="271" r:id="rId3"/>
+    <p:sldId id="273" r:id="rId4"/>
   </p:sldIdLst>
   <p:sldSz cx="12192000" cy="6858000"/>
   <p:notesSz cx="6858000" cy="9144000"/>
@@ -198,7 +199,7 @@
           <a:p>
             <a:fld id="{1FE5360A-AAF9-4E66-A1CA-42D06EE5464D}" type="datetimeFigureOut">
               <a:rPr lang="en-SG" smtClean="0"/>
-              <a:t>12/9/2025</a:t>
+              <a:t>13/9/2025</a:t>
             </a:fld>
             <a:endParaRPr lang="en-SG"/>
           </a:p>
@@ -807,7 +808,7 @@
           <a:p>
             <a:fld id="{4C4676CC-359B-452E-906A-E6E7B13F8520}" type="datetimeFigureOut">
               <a:rPr lang="en-SG" smtClean="0"/>
-              <a:t>12/9/2025</a:t>
+              <a:t>13/9/2025</a:t>
             </a:fld>
             <a:endParaRPr lang="en-SG"/>
           </a:p>
@@ -1007,7 +1008,7 @@
           <a:p>
             <a:fld id="{4C4676CC-359B-452E-906A-E6E7B13F8520}" type="datetimeFigureOut">
               <a:rPr lang="en-SG" smtClean="0"/>
-              <a:t>12/9/2025</a:t>
+              <a:t>13/9/2025</a:t>
             </a:fld>
             <a:endParaRPr lang="en-SG"/>
           </a:p>
@@ -1217,7 +1218,7 @@
           <a:p>
             <a:fld id="{4C4676CC-359B-452E-906A-E6E7B13F8520}" type="datetimeFigureOut">
               <a:rPr lang="en-SG" smtClean="0"/>
-              <a:t>12/9/2025</a:t>
+              <a:t>13/9/2025</a:t>
             </a:fld>
             <a:endParaRPr lang="en-SG"/>
           </a:p>
@@ -1417,7 +1418,7 @@
           <a:p>
             <a:fld id="{4C4676CC-359B-452E-906A-E6E7B13F8520}" type="datetimeFigureOut">
               <a:rPr lang="en-SG" smtClean="0"/>
-              <a:t>12/9/2025</a:t>
+              <a:t>13/9/2025</a:t>
             </a:fld>
             <a:endParaRPr lang="en-SG"/>
           </a:p>
@@ -1693,7 +1694,7 @@
           <a:p>
             <a:fld id="{4C4676CC-359B-452E-906A-E6E7B13F8520}" type="datetimeFigureOut">
               <a:rPr lang="en-SG" smtClean="0"/>
-              <a:t>12/9/2025</a:t>
+              <a:t>13/9/2025</a:t>
             </a:fld>
             <a:endParaRPr lang="en-SG"/>
           </a:p>
@@ -1961,7 +1962,7 @@
           <a:p>
             <a:fld id="{4C4676CC-359B-452E-906A-E6E7B13F8520}" type="datetimeFigureOut">
               <a:rPr lang="en-SG" smtClean="0"/>
-              <a:t>12/9/2025</a:t>
+              <a:t>13/9/2025</a:t>
             </a:fld>
             <a:endParaRPr lang="en-SG"/>
           </a:p>
@@ -2376,7 +2377,7 @@
           <a:p>
             <a:fld id="{4C4676CC-359B-452E-906A-E6E7B13F8520}" type="datetimeFigureOut">
               <a:rPr lang="en-SG" smtClean="0"/>
-              <a:t>12/9/2025</a:t>
+              <a:t>13/9/2025</a:t>
             </a:fld>
             <a:endParaRPr lang="en-SG"/>
           </a:p>
@@ -2518,7 +2519,7 @@
           <a:p>
             <a:fld id="{4C4676CC-359B-452E-906A-E6E7B13F8520}" type="datetimeFigureOut">
               <a:rPr lang="en-SG" smtClean="0"/>
-              <a:t>12/9/2025</a:t>
+              <a:t>13/9/2025</a:t>
             </a:fld>
             <a:endParaRPr lang="en-SG"/>
           </a:p>
@@ -2631,7 +2632,7 @@
           <a:p>
             <a:fld id="{4C4676CC-359B-452E-906A-E6E7B13F8520}" type="datetimeFigureOut">
               <a:rPr lang="en-SG" smtClean="0"/>
-              <a:t>12/9/2025</a:t>
+              <a:t>13/9/2025</a:t>
             </a:fld>
             <a:endParaRPr lang="en-SG"/>
           </a:p>
@@ -2944,7 +2945,7 @@
           <a:p>
             <a:fld id="{4C4676CC-359B-452E-906A-E6E7B13F8520}" type="datetimeFigureOut">
               <a:rPr lang="en-SG" smtClean="0"/>
-              <a:t>12/9/2025</a:t>
+              <a:t>13/9/2025</a:t>
             </a:fld>
             <a:endParaRPr lang="en-SG"/>
           </a:p>
@@ -3233,7 +3234,7 @@
           <a:p>
             <a:fld id="{4C4676CC-359B-452E-906A-E6E7B13F8520}" type="datetimeFigureOut">
               <a:rPr lang="en-SG" smtClean="0"/>
-              <a:t>12/9/2025</a:t>
+              <a:t>13/9/2025</a:t>
             </a:fld>
             <a:endParaRPr lang="en-SG"/>
           </a:p>
@@ -3476,7 +3477,7 @@
           <a:p>
             <a:fld id="{4C4676CC-359B-452E-906A-E6E7B13F8520}" type="datetimeFigureOut">
               <a:rPr lang="en-SG" smtClean="0"/>
-              <a:t>12/9/2025</a:t>
+              <a:t>13/9/2025</a:t>
             </a:fld>
             <a:endParaRPr lang="en-SG"/>
           </a:p>
@@ -15370,6 +15371,2410 @@
     <p:extLst>
       <p:ext uri="{BB962C8B-B14F-4D97-AF65-F5344CB8AC3E}">
         <p14:creationId xmlns:p14="http://schemas.microsoft.com/office/powerpoint/2010/main" val="1468974467"/>
+      </p:ext>
+    </p:extLst>
+  </p:cSld>
+  <p:clrMapOvr>
+    <a:masterClrMapping/>
+  </p:clrMapOvr>
+</p:sld>
+</file>
+
+<file path=ppt/slides/slide3.xml><?xml version="1.0" encoding="utf-8"?>
+<p:sld xmlns:a="http://schemas.openxmlformats.org/drawingml/2006/main" xmlns:r="http://schemas.openxmlformats.org/officeDocument/2006/relationships" xmlns:p="http://schemas.openxmlformats.org/presentationml/2006/main">
+  <p:cSld>
+    <p:spTree>
+      <p:nvGrpSpPr>
+        <p:cNvPr id="1" name=""/>
+        <p:cNvGrpSpPr/>
+        <p:nvPr/>
+      </p:nvGrpSpPr>
+      <p:grpSpPr>
+        <a:xfrm>
+          <a:off x="0" y="0"/>
+          <a:ext cx="0" cy="0"/>
+          <a:chOff x="0" y="0"/>
+          <a:chExt cx="0" cy="0"/>
+        </a:xfrm>
+      </p:grpSpPr>
+      <p:pic>
+        <p:nvPicPr>
+          <p:cNvPr id="23" name="Picture 22">
+            <a:extLst>
+              <a:ext uri="{FF2B5EF4-FFF2-40B4-BE49-F238E27FC236}">
+                <a16:creationId xmlns:a16="http://schemas.microsoft.com/office/drawing/2014/main" id="{A93D2BF5-D606-939F-3863-1048405CD37A}"/>
+              </a:ext>
+            </a:extLst>
+          </p:cNvPr>
+          <p:cNvPicPr>
+            <a:picLocks noChangeAspect="1"/>
+          </p:cNvPicPr>
+          <p:nvPr/>
+        </p:nvPicPr>
+        <p:blipFill>
+          <a:blip r:embed="rId2"/>
+          <a:stretch>
+            <a:fillRect/>
+          </a:stretch>
+        </p:blipFill>
+        <p:spPr>
+          <a:xfrm rot="16200000">
+            <a:off x="1673057" y="1178371"/>
+            <a:ext cx="476190" cy="685714"/>
+          </a:xfrm>
+          <a:prstGeom prst="rect">
+            <a:avLst/>
+          </a:prstGeom>
+        </p:spPr>
+      </p:pic>
+      <p:pic>
+        <p:nvPicPr>
+          <p:cNvPr id="5" name="Picture 4" descr="A computer screen shot of a road&#10;&#10;AI-generated content may be incorrect.">
+            <a:extLst>
+              <a:ext uri="{FF2B5EF4-FFF2-40B4-BE49-F238E27FC236}">
+                <a16:creationId xmlns:a16="http://schemas.microsoft.com/office/drawing/2014/main" id="{90E5AF49-3056-0DA5-D133-F01C11911DDB}"/>
+              </a:ext>
+            </a:extLst>
+          </p:cNvPr>
+          <p:cNvPicPr>
+            <a:picLocks noChangeAspect="1"/>
+          </p:cNvPicPr>
+          <p:nvPr/>
+        </p:nvPicPr>
+        <p:blipFill>
+          <a:blip r:embed="rId3">
+            <a:extLst>
+              <a:ext uri="{28A0092B-C50C-407E-A947-70E740481C1C}">
+                <a14:useLocalDpi xmlns:a14="http://schemas.microsoft.com/office/drawing/2010/main" val="0"/>
+              </a:ext>
+            </a:extLst>
+          </a:blip>
+          <a:stretch>
+            <a:fillRect/>
+          </a:stretch>
+        </p:blipFill>
+        <p:spPr>
+          <a:xfrm>
+            <a:off x="7569522" y="668298"/>
+            <a:ext cx="3142645" cy="1689173"/>
+          </a:xfrm>
+          <a:prstGeom prst="rect">
+            <a:avLst/>
+          </a:prstGeom>
+          <a:ln w="3175">
+            <a:solidFill>
+              <a:schemeClr val="tx1"/>
+            </a:solidFill>
+          </a:ln>
+        </p:spPr>
+      </p:pic>
+      <p:sp>
+        <p:nvSpPr>
+          <p:cNvPr id="6" name="Rectangle 5">
+            <a:extLst>
+              <a:ext uri="{FF2B5EF4-FFF2-40B4-BE49-F238E27FC236}">
+                <a16:creationId xmlns:a16="http://schemas.microsoft.com/office/drawing/2014/main" id="{D0F329BF-893B-D36D-F376-A8B1D49E6C76}"/>
+              </a:ext>
+            </a:extLst>
+          </p:cNvPr>
+          <p:cNvSpPr/>
+          <p:nvPr/>
+        </p:nvSpPr>
+        <p:spPr>
+          <a:xfrm>
+            <a:off x="3079803" y="738983"/>
+            <a:ext cx="2185416" cy="1618488"/>
+          </a:xfrm>
+          <a:prstGeom prst="rect">
+            <a:avLst/>
+          </a:prstGeom>
+          <a:noFill/>
+        </p:spPr>
+        <p:style>
+          <a:lnRef idx="2">
+            <a:schemeClr val="accent1">
+              <a:shade val="15000"/>
+            </a:schemeClr>
+          </a:lnRef>
+          <a:fillRef idx="1">
+            <a:schemeClr val="accent1"/>
+          </a:fillRef>
+          <a:effectRef idx="0">
+            <a:schemeClr val="accent1"/>
+          </a:effectRef>
+          <a:fontRef idx="minor">
+            <a:schemeClr val="lt1"/>
+          </a:fontRef>
+        </p:style>
+        <p:txBody>
+          <a:bodyPr rtlCol="0" anchor="ctr"/>
+          <a:lstStyle/>
+          <a:p>
+            <a:pPr algn="ctr"/>
+            <a:endParaRPr lang="en-SG" dirty="0"/>
+          </a:p>
+        </p:txBody>
+      </p:sp>
+      <p:pic>
+        <p:nvPicPr>
+          <p:cNvPr id="8" name="Picture 7" descr="A grey electronic device with buttons and ports&#10;&#10;AI-generated content may be incorrect.">
+            <a:extLst>
+              <a:ext uri="{FF2B5EF4-FFF2-40B4-BE49-F238E27FC236}">
+                <a16:creationId xmlns:a16="http://schemas.microsoft.com/office/drawing/2014/main" id="{1C21FDC3-E91E-AC19-8880-0330D0663E89}"/>
+              </a:ext>
+            </a:extLst>
+          </p:cNvPr>
+          <p:cNvPicPr>
+            <a:picLocks noChangeAspect="1"/>
+          </p:cNvPicPr>
+          <p:nvPr/>
+        </p:nvPicPr>
+        <p:blipFill>
+          <a:blip r:embed="rId4">
+            <a:extLst>
+              <a:ext uri="{28A0092B-C50C-407E-A947-70E740481C1C}">
+                <a14:useLocalDpi xmlns:a14="http://schemas.microsoft.com/office/drawing/2010/main" val="0"/>
+              </a:ext>
+            </a:extLst>
+          </a:blip>
+          <a:stretch>
+            <a:fillRect/>
+          </a:stretch>
+        </p:blipFill>
+        <p:spPr>
+          <a:xfrm>
+            <a:off x="3148703" y="799208"/>
+            <a:ext cx="475613" cy="475613"/>
+          </a:xfrm>
+          <a:prstGeom prst="rect">
+            <a:avLst/>
+          </a:prstGeom>
+          <a:ln w="6350">
+            <a:solidFill>
+              <a:schemeClr val="tx1"/>
+            </a:solidFill>
+          </a:ln>
+        </p:spPr>
+      </p:pic>
+      <p:pic>
+        <p:nvPicPr>
+          <p:cNvPr id="10" name="Picture 9" descr="A green circle with a white light&#10;&#10;AI-generated content may be incorrect.">
+            <a:extLst>
+              <a:ext uri="{FF2B5EF4-FFF2-40B4-BE49-F238E27FC236}">
+                <a16:creationId xmlns:a16="http://schemas.microsoft.com/office/drawing/2014/main" id="{95F29263-B884-FE91-1415-29FFDF07E2F2}"/>
+              </a:ext>
+            </a:extLst>
+          </p:cNvPr>
+          <p:cNvPicPr>
+            <a:picLocks noChangeAspect="1"/>
+          </p:cNvPicPr>
+          <p:nvPr/>
+        </p:nvPicPr>
+        <p:blipFill>
+          <a:blip r:embed="rId5">
+            <a:extLst>
+              <a:ext uri="{28A0092B-C50C-407E-A947-70E740481C1C}">
+                <a14:useLocalDpi xmlns:a14="http://schemas.microsoft.com/office/drawing/2010/main" val="0"/>
+              </a:ext>
+            </a:extLst>
+          </a:blip>
+          <a:stretch>
+            <a:fillRect/>
+          </a:stretch>
+        </p:blipFill>
+        <p:spPr>
+          <a:xfrm>
+            <a:off x="1180241" y="958404"/>
+            <a:ext cx="599185" cy="612211"/>
+          </a:xfrm>
+          <a:prstGeom prst="rect">
+            <a:avLst/>
+          </a:prstGeom>
+        </p:spPr>
+      </p:pic>
+      <p:sp>
+        <p:nvSpPr>
+          <p:cNvPr id="11" name="TextBox 10">
+            <a:extLst>
+              <a:ext uri="{FF2B5EF4-FFF2-40B4-BE49-F238E27FC236}">
+                <a16:creationId xmlns:a16="http://schemas.microsoft.com/office/drawing/2014/main" id="{06B99710-94F2-7F58-19D9-1338E9506EEE}"/>
+              </a:ext>
+            </a:extLst>
+          </p:cNvPr>
+          <p:cNvSpPr txBox="1"/>
+          <p:nvPr/>
+        </p:nvSpPr>
+        <p:spPr>
+          <a:xfrm>
+            <a:off x="3009303" y="461984"/>
+            <a:ext cx="2253264" cy="276999"/>
+          </a:xfrm>
+          <a:prstGeom prst="rect">
+            <a:avLst/>
+          </a:prstGeom>
+          <a:noFill/>
+        </p:spPr>
+        <p:txBody>
+          <a:bodyPr wrap="square">
+            <a:spAutoFit/>
+          </a:bodyPr>
+          <a:lstStyle/>
+          <a:p>
+            <a:r>
+              <a:rPr lang="en-US" sz="1200" b="1" dirty="0">
+                <a:solidFill>
+                  <a:schemeClr val="tx1">
+                    <a:lumMod val="75000"/>
+                    <a:lumOff val="25000"/>
+                  </a:schemeClr>
+                </a:solidFill>
+              </a:rPr>
+              <a:t>Runway Light Control PLC01</a:t>
+            </a:r>
+            <a:endParaRPr lang="en-SG" sz="1200" b="1" dirty="0">
+              <a:solidFill>
+                <a:schemeClr val="tx1">
+                  <a:lumMod val="75000"/>
+                  <a:lumOff val="25000"/>
+                </a:schemeClr>
+              </a:solidFill>
+            </a:endParaRPr>
+          </a:p>
+        </p:txBody>
+      </p:sp>
+      <p:sp>
+        <p:nvSpPr>
+          <p:cNvPr id="12" name="TextBox 11">
+            <a:extLst>
+              <a:ext uri="{FF2B5EF4-FFF2-40B4-BE49-F238E27FC236}">
+                <a16:creationId xmlns:a16="http://schemas.microsoft.com/office/drawing/2014/main" id="{3299FDAF-7FE8-4AD8-7C7D-B7EAEA2985B1}"/>
+              </a:ext>
+            </a:extLst>
+          </p:cNvPr>
+          <p:cNvSpPr txBox="1"/>
+          <p:nvPr/>
+        </p:nvSpPr>
+        <p:spPr>
+          <a:xfrm>
+            <a:off x="3734852" y="799208"/>
+            <a:ext cx="1419831" cy="276999"/>
+          </a:xfrm>
+          <a:prstGeom prst="rect">
+            <a:avLst/>
+          </a:prstGeom>
+          <a:noFill/>
+        </p:spPr>
+        <p:txBody>
+          <a:bodyPr wrap="square">
+            <a:spAutoFit/>
+          </a:bodyPr>
+          <a:lstStyle/>
+          <a:p>
+            <a:r>
+              <a:rPr lang="en-US" sz="1200" b="1" dirty="0">
+                <a:solidFill>
+                  <a:schemeClr val="tx1">
+                    <a:lumMod val="75000"/>
+                    <a:lumOff val="25000"/>
+                  </a:schemeClr>
+                </a:solidFill>
+              </a:rPr>
+              <a:t>PLC Address [11]</a:t>
+            </a:r>
+            <a:endParaRPr lang="en-SG" sz="1200" b="1" dirty="0">
+              <a:solidFill>
+                <a:schemeClr val="tx1">
+                  <a:lumMod val="75000"/>
+                  <a:lumOff val="25000"/>
+                </a:schemeClr>
+              </a:solidFill>
+            </a:endParaRPr>
+          </a:p>
+        </p:txBody>
+      </p:sp>
+      <p:sp>
+        <p:nvSpPr>
+          <p:cNvPr id="13" name="Rectangle 12">
+            <a:extLst>
+              <a:ext uri="{FF2B5EF4-FFF2-40B4-BE49-F238E27FC236}">
+                <a16:creationId xmlns:a16="http://schemas.microsoft.com/office/drawing/2014/main" id="{1C1842D5-820F-BD59-3970-807B8FEFB327}"/>
+              </a:ext>
+            </a:extLst>
+          </p:cNvPr>
+          <p:cNvSpPr/>
+          <p:nvPr/>
+        </p:nvSpPr>
+        <p:spPr>
+          <a:xfrm>
+            <a:off x="3330378" y="1367003"/>
+            <a:ext cx="1671390" cy="347745"/>
+          </a:xfrm>
+          <a:prstGeom prst="rect">
+            <a:avLst/>
+          </a:prstGeom>
+        </p:spPr>
+        <p:style>
+          <a:lnRef idx="2">
+            <a:schemeClr val="accent1">
+              <a:shade val="15000"/>
+            </a:schemeClr>
+          </a:lnRef>
+          <a:fillRef idx="1">
+            <a:schemeClr val="accent1"/>
+          </a:fillRef>
+          <a:effectRef idx="0">
+            <a:schemeClr val="accent1"/>
+          </a:effectRef>
+          <a:fontRef idx="minor">
+            <a:schemeClr val="lt1"/>
+          </a:fontRef>
+        </p:style>
+        <p:txBody>
+          <a:bodyPr rtlCol="0" anchor="ctr"/>
+          <a:lstStyle/>
+          <a:p>
+            <a:pPr algn="ctr"/>
+            <a:r>
+              <a:rPr lang="en-US" sz="1200" dirty="0"/>
+              <a:t>Measurement point (M_SP_NA_1) IOA=01</a:t>
+            </a:r>
+            <a:endParaRPr lang="en-SG" sz="1200" dirty="0"/>
+          </a:p>
+        </p:txBody>
+      </p:sp>
+      <p:sp>
+        <p:nvSpPr>
+          <p:cNvPr id="14" name="Rectangle 13">
+            <a:extLst>
+              <a:ext uri="{FF2B5EF4-FFF2-40B4-BE49-F238E27FC236}">
+                <a16:creationId xmlns:a16="http://schemas.microsoft.com/office/drawing/2014/main" id="{D1D2A8E4-7CF9-DDBE-2B17-AFB608623A16}"/>
+              </a:ext>
+            </a:extLst>
+          </p:cNvPr>
+          <p:cNvSpPr/>
+          <p:nvPr/>
+        </p:nvSpPr>
+        <p:spPr>
+          <a:xfrm>
+            <a:off x="3330378" y="1896113"/>
+            <a:ext cx="1671390" cy="347745"/>
+          </a:xfrm>
+          <a:prstGeom prst="rect">
+            <a:avLst/>
+          </a:prstGeom>
+        </p:spPr>
+        <p:style>
+          <a:lnRef idx="2">
+            <a:schemeClr val="accent6">
+              <a:shade val="15000"/>
+            </a:schemeClr>
+          </a:lnRef>
+          <a:fillRef idx="1">
+            <a:schemeClr val="accent6"/>
+          </a:fillRef>
+          <a:effectRef idx="0">
+            <a:schemeClr val="accent6"/>
+          </a:effectRef>
+          <a:fontRef idx="minor">
+            <a:schemeClr val="lt1"/>
+          </a:fontRef>
+        </p:style>
+        <p:txBody>
+          <a:bodyPr rtlCol="0" anchor="ctr"/>
+          <a:lstStyle/>
+          <a:p>
+            <a:pPr algn="ctr"/>
+            <a:r>
+              <a:rPr lang="en-US" sz="1200" dirty="0"/>
+              <a:t>Changeable Point (C_CR_TA_1) IOT=11</a:t>
+            </a:r>
+            <a:endParaRPr lang="en-SG" sz="1200" dirty="0"/>
+          </a:p>
+        </p:txBody>
+      </p:sp>
+      <p:cxnSp>
+        <p:nvCxnSpPr>
+          <p:cNvPr id="16" name="Connector: Elbow 15">
+            <a:extLst>
+              <a:ext uri="{FF2B5EF4-FFF2-40B4-BE49-F238E27FC236}">
+                <a16:creationId xmlns:a16="http://schemas.microsoft.com/office/drawing/2014/main" id="{1BDBF722-2F64-F4E3-A141-B8BB7612D057}"/>
+              </a:ext>
+            </a:extLst>
+          </p:cNvPr>
+          <p:cNvCxnSpPr>
+            <a:cxnSpLocks/>
+            <a:stCxn id="14" idx="1"/>
+            <a:endCxn id="10" idx="2"/>
+          </p:cNvCxnSpPr>
+          <p:nvPr/>
+        </p:nvCxnSpPr>
+        <p:spPr>
+          <a:xfrm rot="10800000">
+            <a:off x="1479834" y="1570616"/>
+            <a:ext cx="1850544" cy="499371"/>
+          </a:xfrm>
+          <a:prstGeom prst="bentConnector2">
+            <a:avLst/>
+          </a:prstGeom>
+          <a:ln>
+            <a:solidFill>
+              <a:schemeClr val="accent6">
+                <a:lumMod val="75000"/>
+              </a:schemeClr>
+            </a:solidFill>
+          </a:ln>
+        </p:spPr>
+        <p:style>
+          <a:lnRef idx="2">
+            <a:schemeClr val="accent1"/>
+          </a:lnRef>
+          <a:fillRef idx="0">
+            <a:schemeClr val="accent1"/>
+          </a:fillRef>
+          <a:effectRef idx="1">
+            <a:schemeClr val="accent1"/>
+          </a:effectRef>
+          <a:fontRef idx="minor">
+            <a:schemeClr val="tx1"/>
+          </a:fontRef>
+        </p:style>
+      </p:cxnSp>
+      <p:cxnSp>
+        <p:nvCxnSpPr>
+          <p:cNvPr id="20" name="Straight Connector 19">
+            <a:extLst>
+              <a:ext uri="{FF2B5EF4-FFF2-40B4-BE49-F238E27FC236}">
+                <a16:creationId xmlns:a16="http://schemas.microsoft.com/office/drawing/2014/main" id="{5157EF60-A02E-7520-1646-25495E56D960}"/>
+              </a:ext>
+            </a:extLst>
+          </p:cNvPr>
+          <p:cNvCxnSpPr>
+            <a:cxnSpLocks/>
+            <a:stCxn id="13" idx="1"/>
+            <a:endCxn id="23" idx="2"/>
+          </p:cNvCxnSpPr>
+          <p:nvPr/>
+        </p:nvCxnSpPr>
+        <p:spPr>
+          <a:xfrm flipH="1" flipV="1">
+            <a:off x="2254009" y="1521228"/>
+            <a:ext cx="1076369" cy="19648"/>
+          </a:xfrm>
+          <a:prstGeom prst="line">
+            <a:avLst/>
+          </a:prstGeom>
+        </p:spPr>
+        <p:style>
+          <a:lnRef idx="2">
+            <a:schemeClr val="accent1"/>
+          </a:lnRef>
+          <a:fillRef idx="0">
+            <a:schemeClr val="accent1"/>
+          </a:fillRef>
+          <a:effectRef idx="1">
+            <a:schemeClr val="accent1"/>
+          </a:effectRef>
+          <a:fontRef idx="minor">
+            <a:schemeClr val="tx1"/>
+          </a:fontRef>
+        </p:style>
+      </p:cxnSp>
+      <p:sp>
+        <p:nvSpPr>
+          <p:cNvPr id="25" name="TextBox 24">
+            <a:extLst>
+              <a:ext uri="{FF2B5EF4-FFF2-40B4-BE49-F238E27FC236}">
+                <a16:creationId xmlns:a16="http://schemas.microsoft.com/office/drawing/2014/main" id="{4529E912-ECD9-0879-2EE0-0D6518717725}"/>
+              </a:ext>
+            </a:extLst>
+          </p:cNvPr>
+          <p:cNvSpPr txBox="1"/>
+          <p:nvPr/>
+        </p:nvSpPr>
+        <p:spPr>
+          <a:xfrm>
+            <a:off x="980993" y="705270"/>
+            <a:ext cx="1269940" cy="276999"/>
+          </a:xfrm>
+          <a:prstGeom prst="rect">
+            <a:avLst/>
+          </a:prstGeom>
+          <a:noFill/>
+        </p:spPr>
+        <p:txBody>
+          <a:bodyPr wrap="square">
+            <a:spAutoFit/>
+          </a:bodyPr>
+          <a:lstStyle/>
+          <a:p>
+            <a:r>
+              <a:rPr lang="en-US" sz="1200" b="1" dirty="0">
+                <a:solidFill>
+                  <a:schemeClr val="tx1">
+                    <a:lumMod val="75000"/>
+                    <a:lumOff val="25000"/>
+                  </a:schemeClr>
+                </a:solidFill>
+              </a:rPr>
+              <a:t>Runway Light </a:t>
+            </a:r>
+            <a:endParaRPr lang="en-SG" sz="1200" b="1" dirty="0">
+              <a:solidFill>
+                <a:schemeClr val="tx1">
+                  <a:lumMod val="75000"/>
+                  <a:lumOff val="25000"/>
+                </a:schemeClr>
+              </a:solidFill>
+            </a:endParaRPr>
+          </a:p>
+        </p:txBody>
+      </p:sp>
+      <p:sp>
+        <p:nvSpPr>
+          <p:cNvPr id="26" name="TextBox 25">
+            <a:extLst>
+              <a:ext uri="{FF2B5EF4-FFF2-40B4-BE49-F238E27FC236}">
+                <a16:creationId xmlns:a16="http://schemas.microsoft.com/office/drawing/2014/main" id="{F6D58FA2-F610-E5CB-72D6-4EF3C3E3933A}"/>
+              </a:ext>
+            </a:extLst>
+          </p:cNvPr>
+          <p:cNvSpPr txBox="1"/>
+          <p:nvPr/>
+        </p:nvSpPr>
+        <p:spPr>
+          <a:xfrm>
+            <a:off x="1794645" y="1608320"/>
+            <a:ext cx="1269940" cy="461665"/>
+          </a:xfrm>
+          <a:prstGeom prst="rect">
+            <a:avLst/>
+          </a:prstGeom>
+          <a:noFill/>
+        </p:spPr>
+        <p:txBody>
+          <a:bodyPr wrap="square">
+            <a:spAutoFit/>
+          </a:bodyPr>
+          <a:lstStyle/>
+          <a:p>
+            <a:r>
+              <a:rPr lang="en-US" sz="1200" b="1" dirty="0">
+                <a:solidFill>
+                  <a:schemeClr val="tx1">
+                    <a:lumMod val="75000"/>
+                    <a:lumOff val="25000"/>
+                  </a:schemeClr>
+                </a:solidFill>
+              </a:rPr>
+              <a:t>Runway Light state sensor </a:t>
+            </a:r>
+            <a:endParaRPr lang="en-SG" sz="1200" b="1" dirty="0">
+              <a:solidFill>
+                <a:schemeClr val="tx1">
+                  <a:lumMod val="75000"/>
+                  <a:lumOff val="25000"/>
+                </a:schemeClr>
+              </a:solidFill>
+            </a:endParaRPr>
+          </a:p>
+        </p:txBody>
+      </p:sp>
+      <p:cxnSp>
+        <p:nvCxnSpPr>
+          <p:cNvPr id="28" name="Straight Arrow Connector 27">
+            <a:extLst>
+              <a:ext uri="{FF2B5EF4-FFF2-40B4-BE49-F238E27FC236}">
+                <a16:creationId xmlns:a16="http://schemas.microsoft.com/office/drawing/2014/main" id="{8D2A967C-C5BC-DA01-5BBA-AE339646A7E2}"/>
+              </a:ext>
+            </a:extLst>
+          </p:cNvPr>
+          <p:cNvCxnSpPr>
+            <a:stCxn id="13" idx="3"/>
+            <a:endCxn id="5" idx="1"/>
+          </p:cNvCxnSpPr>
+          <p:nvPr/>
+        </p:nvCxnSpPr>
+        <p:spPr>
+          <a:xfrm flipV="1">
+            <a:off x="5001768" y="1512885"/>
+            <a:ext cx="2567754" cy="0"/>
+          </a:xfrm>
+          <a:prstGeom prst="straightConnector1">
+            <a:avLst/>
+          </a:prstGeom>
+          <a:ln>
+            <a:tailEnd type="triangle"/>
+          </a:ln>
+        </p:spPr>
+        <p:style>
+          <a:lnRef idx="2">
+            <a:schemeClr val="accent1"/>
+          </a:lnRef>
+          <a:fillRef idx="0">
+            <a:schemeClr val="accent1"/>
+          </a:fillRef>
+          <a:effectRef idx="1">
+            <a:schemeClr val="accent1"/>
+          </a:effectRef>
+          <a:fontRef idx="minor">
+            <a:schemeClr val="tx1"/>
+          </a:fontRef>
+        </p:style>
+      </p:cxnSp>
+      <p:cxnSp>
+        <p:nvCxnSpPr>
+          <p:cNvPr id="29" name="Straight Arrow Connector 28">
+            <a:extLst>
+              <a:ext uri="{FF2B5EF4-FFF2-40B4-BE49-F238E27FC236}">
+                <a16:creationId xmlns:a16="http://schemas.microsoft.com/office/drawing/2014/main" id="{E37D7F65-511D-3E67-6293-87C235F451E7}"/>
+              </a:ext>
+            </a:extLst>
+          </p:cNvPr>
+          <p:cNvCxnSpPr>
+            <a:cxnSpLocks/>
+          </p:cNvCxnSpPr>
+          <p:nvPr/>
+        </p:nvCxnSpPr>
+        <p:spPr>
+          <a:xfrm flipH="1">
+            <a:off x="5001768" y="2069985"/>
+            <a:ext cx="2567754" cy="0"/>
+          </a:xfrm>
+          <a:prstGeom prst="straightConnector1">
+            <a:avLst/>
+          </a:prstGeom>
+          <a:ln>
+            <a:tailEnd type="triangle"/>
+          </a:ln>
+        </p:spPr>
+        <p:style>
+          <a:lnRef idx="2">
+            <a:schemeClr val="accent1"/>
+          </a:lnRef>
+          <a:fillRef idx="0">
+            <a:schemeClr val="accent1"/>
+          </a:fillRef>
+          <a:effectRef idx="1">
+            <a:schemeClr val="accent1"/>
+          </a:effectRef>
+          <a:fontRef idx="minor">
+            <a:schemeClr val="tx1"/>
+          </a:fontRef>
+        </p:style>
+      </p:cxnSp>
+      <p:sp>
+        <p:nvSpPr>
+          <p:cNvPr id="32" name="TextBox 31">
+            <a:extLst>
+              <a:ext uri="{FF2B5EF4-FFF2-40B4-BE49-F238E27FC236}">
+                <a16:creationId xmlns:a16="http://schemas.microsoft.com/office/drawing/2014/main" id="{4DEE1F01-8558-DA84-A7AD-0C36D8E155FD}"/>
+              </a:ext>
+            </a:extLst>
+          </p:cNvPr>
+          <p:cNvSpPr txBox="1"/>
+          <p:nvPr/>
+        </p:nvSpPr>
+        <p:spPr>
+          <a:xfrm>
+            <a:off x="7475624" y="391299"/>
+            <a:ext cx="2253264" cy="276999"/>
+          </a:xfrm>
+          <a:prstGeom prst="rect">
+            <a:avLst/>
+          </a:prstGeom>
+          <a:noFill/>
+        </p:spPr>
+        <p:txBody>
+          <a:bodyPr wrap="square">
+            <a:spAutoFit/>
+          </a:bodyPr>
+          <a:lstStyle/>
+          <a:p>
+            <a:r>
+              <a:rPr lang="en-US" sz="1200" b="1" dirty="0">
+                <a:solidFill>
+                  <a:schemeClr val="tx1">
+                    <a:lumMod val="75000"/>
+                    <a:lumOff val="25000"/>
+                  </a:schemeClr>
+                </a:solidFill>
+              </a:rPr>
+              <a:t>Light Control HMI</a:t>
+            </a:r>
+            <a:endParaRPr lang="en-SG" sz="1200" b="1" dirty="0">
+              <a:solidFill>
+                <a:schemeClr val="tx1">
+                  <a:lumMod val="75000"/>
+                  <a:lumOff val="25000"/>
+                </a:schemeClr>
+              </a:solidFill>
+            </a:endParaRPr>
+          </a:p>
+        </p:txBody>
+      </p:sp>
+      <p:sp>
+        <p:nvSpPr>
+          <p:cNvPr id="33" name="TextBox 32">
+            <a:extLst>
+              <a:ext uri="{FF2B5EF4-FFF2-40B4-BE49-F238E27FC236}">
+                <a16:creationId xmlns:a16="http://schemas.microsoft.com/office/drawing/2014/main" id="{3057711F-994A-E3B1-6761-34AB9B72523B}"/>
+              </a:ext>
+            </a:extLst>
+          </p:cNvPr>
+          <p:cNvSpPr txBox="1"/>
+          <p:nvPr/>
+        </p:nvSpPr>
+        <p:spPr>
+          <a:xfrm>
+            <a:off x="5464983" y="1228503"/>
+            <a:ext cx="1902123" cy="276999"/>
+          </a:xfrm>
+          <a:prstGeom prst="rect">
+            <a:avLst/>
+          </a:prstGeom>
+          <a:noFill/>
+        </p:spPr>
+        <p:txBody>
+          <a:bodyPr wrap="square">
+            <a:spAutoFit/>
+          </a:bodyPr>
+          <a:lstStyle/>
+          <a:p>
+            <a:r>
+              <a:rPr lang="en-US" sz="1200" b="1" dirty="0">
+                <a:solidFill>
+                  <a:schemeClr val="tx1">
+                    <a:lumMod val="75000"/>
+                    <a:lumOff val="25000"/>
+                  </a:schemeClr>
+                </a:solidFill>
+              </a:rPr>
+              <a:t>Light state report data </a:t>
+            </a:r>
+            <a:endParaRPr lang="en-SG" sz="1200" b="1" dirty="0">
+              <a:solidFill>
+                <a:schemeClr val="tx1">
+                  <a:lumMod val="75000"/>
+                  <a:lumOff val="25000"/>
+                </a:schemeClr>
+              </a:solidFill>
+            </a:endParaRPr>
+          </a:p>
+        </p:txBody>
+      </p:sp>
+      <p:sp>
+        <p:nvSpPr>
+          <p:cNvPr id="34" name="TextBox 33">
+            <a:extLst>
+              <a:ext uri="{FF2B5EF4-FFF2-40B4-BE49-F238E27FC236}">
+                <a16:creationId xmlns:a16="http://schemas.microsoft.com/office/drawing/2014/main" id="{C1BEF5BB-2B19-48AD-0288-9DBF517988DC}"/>
+              </a:ext>
+            </a:extLst>
+          </p:cNvPr>
+          <p:cNvSpPr txBox="1"/>
+          <p:nvPr/>
+        </p:nvSpPr>
+        <p:spPr>
+          <a:xfrm>
+            <a:off x="6615392" y="4682408"/>
+            <a:ext cx="1335911" cy="646331"/>
+          </a:xfrm>
+          <a:prstGeom prst="rect">
+            <a:avLst/>
+          </a:prstGeom>
+          <a:noFill/>
+        </p:spPr>
+        <p:txBody>
+          <a:bodyPr wrap="square">
+            <a:spAutoFit/>
+          </a:bodyPr>
+          <a:lstStyle/>
+          <a:p>
+            <a:r>
+              <a:rPr lang="en-US" sz="1200" b="1" dirty="0">
+                <a:solidFill>
+                  <a:schemeClr val="accent6">
+                    <a:lumMod val="75000"/>
+                  </a:schemeClr>
+                </a:solidFill>
+              </a:rPr>
+              <a:t>Original Light state change request</a:t>
+            </a:r>
+            <a:endParaRPr lang="en-SG" sz="1200" b="1" dirty="0">
+              <a:solidFill>
+                <a:schemeClr val="accent6">
+                  <a:lumMod val="75000"/>
+                </a:schemeClr>
+              </a:solidFill>
+            </a:endParaRPr>
+          </a:p>
+        </p:txBody>
+      </p:sp>
+      <p:pic>
+        <p:nvPicPr>
+          <p:cNvPr id="35" name="Graphic 34" descr="Target with solid fill">
+            <a:extLst>
+              <a:ext uri="{FF2B5EF4-FFF2-40B4-BE49-F238E27FC236}">
+                <a16:creationId xmlns:a16="http://schemas.microsoft.com/office/drawing/2014/main" id="{03C2E85B-6D08-523A-3DDE-B50707195FBD}"/>
+              </a:ext>
+            </a:extLst>
+          </p:cNvPr>
+          <p:cNvPicPr>
+            <a:picLocks noChangeAspect="1"/>
+          </p:cNvPicPr>
+          <p:nvPr/>
+        </p:nvPicPr>
+        <p:blipFill>
+          <a:blip r:embed="rId6">
+            <a:extLst>
+              <a:ext uri="{96DAC541-7B7A-43D3-8B79-37D633B846F1}">
+                <asvg:svgBlip xmlns:asvg="http://schemas.microsoft.com/office/drawing/2016/SVG/main" r:embed="rId7"/>
+              </a:ext>
+            </a:extLst>
+          </a:blip>
+          <a:stretch>
+            <a:fillRect/>
+          </a:stretch>
+        </p:blipFill>
+        <p:spPr>
+          <a:xfrm>
+            <a:off x="7081155" y="1254477"/>
+            <a:ext cx="485715" cy="485715"/>
+          </a:xfrm>
+          <a:prstGeom prst="rect">
+            <a:avLst/>
+          </a:prstGeom>
+        </p:spPr>
+      </p:pic>
+      <p:pic>
+        <p:nvPicPr>
+          <p:cNvPr id="37" name="Picture 36">
+            <a:extLst>
+              <a:ext uri="{FF2B5EF4-FFF2-40B4-BE49-F238E27FC236}">
+                <a16:creationId xmlns:a16="http://schemas.microsoft.com/office/drawing/2014/main" id="{A9739046-08A1-5FFA-F2A8-6E4FD2FDEAE1}"/>
+              </a:ext>
+            </a:extLst>
+          </p:cNvPr>
+          <p:cNvPicPr>
+            <a:picLocks noChangeAspect="1"/>
+          </p:cNvPicPr>
+          <p:nvPr/>
+        </p:nvPicPr>
+        <p:blipFill>
+          <a:blip r:embed="rId2"/>
+          <a:stretch>
+            <a:fillRect/>
+          </a:stretch>
+        </p:blipFill>
+        <p:spPr>
+          <a:xfrm rot="16200000">
+            <a:off x="1579159" y="3525575"/>
+            <a:ext cx="476190" cy="685714"/>
+          </a:xfrm>
+          <a:prstGeom prst="rect">
+            <a:avLst/>
+          </a:prstGeom>
+        </p:spPr>
+      </p:pic>
+      <p:pic>
+        <p:nvPicPr>
+          <p:cNvPr id="38" name="Picture 37" descr="A computer screen shot of a road&#10;&#10;AI-generated content may be incorrect.">
+            <a:extLst>
+              <a:ext uri="{FF2B5EF4-FFF2-40B4-BE49-F238E27FC236}">
+                <a16:creationId xmlns:a16="http://schemas.microsoft.com/office/drawing/2014/main" id="{CD66DC19-85CD-C059-AFEE-789573B6E681}"/>
+              </a:ext>
+            </a:extLst>
+          </p:cNvPr>
+          <p:cNvPicPr>
+            <a:picLocks noChangeAspect="1"/>
+          </p:cNvPicPr>
+          <p:nvPr/>
+        </p:nvPicPr>
+        <p:blipFill>
+          <a:blip r:embed="rId3">
+            <a:extLst>
+              <a:ext uri="{28A0092B-C50C-407E-A947-70E740481C1C}">
+                <a14:useLocalDpi xmlns:a14="http://schemas.microsoft.com/office/drawing/2010/main" val="0"/>
+              </a:ext>
+            </a:extLst>
+          </a:blip>
+          <a:stretch>
+            <a:fillRect/>
+          </a:stretch>
+        </p:blipFill>
+        <p:spPr>
+          <a:xfrm>
+            <a:off x="7475624" y="3015502"/>
+            <a:ext cx="3142645" cy="1689173"/>
+          </a:xfrm>
+          <a:prstGeom prst="rect">
+            <a:avLst/>
+          </a:prstGeom>
+          <a:ln w="3175">
+            <a:solidFill>
+              <a:schemeClr val="tx1"/>
+            </a:solidFill>
+          </a:ln>
+        </p:spPr>
+      </p:pic>
+      <p:sp>
+        <p:nvSpPr>
+          <p:cNvPr id="39" name="Rectangle 38">
+            <a:extLst>
+              <a:ext uri="{FF2B5EF4-FFF2-40B4-BE49-F238E27FC236}">
+                <a16:creationId xmlns:a16="http://schemas.microsoft.com/office/drawing/2014/main" id="{28E9D4DB-7BD0-3E5D-7F1A-E4138BD6E30D}"/>
+              </a:ext>
+            </a:extLst>
+          </p:cNvPr>
+          <p:cNvSpPr/>
+          <p:nvPr/>
+        </p:nvSpPr>
+        <p:spPr>
+          <a:xfrm>
+            <a:off x="2985905" y="3086187"/>
+            <a:ext cx="2185416" cy="1618488"/>
+          </a:xfrm>
+          <a:prstGeom prst="rect">
+            <a:avLst/>
+          </a:prstGeom>
+          <a:noFill/>
+        </p:spPr>
+        <p:style>
+          <a:lnRef idx="2">
+            <a:schemeClr val="accent1">
+              <a:shade val="15000"/>
+            </a:schemeClr>
+          </a:lnRef>
+          <a:fillRef idx="1">
+            <a:schemeClr val="accent1"/>
+          </a:fillRef>
+          <a:effectRef idx="0">
+            <a:schemeClr val="accent1"/>
+          </a:effectRef>
+          <a:fontRef idx="minor">
+            <a:schemeClr val="lt1"/>
+          </a:fontRef>
+        </p:style>
+        <p:txBody>
+          <a:bodyPr rtlCol="0" anchor="ctr"/>
+          <a:lstStyle/>
+          <a:p>
+            <a:pPr algn="ctr"/>
+            <a:endParaRPr lang="en-SG" dirty="0"/>
+          </a:p>
+        </p:txBody>
+      </p:sp>
+      <p:pic>
+        <p:nvPicPr>
+          <p:cNvPr id="40" name="Picture 39" descr="A grey electronic device with buttons and ports&#10;&#10;AI-generated content may be incorrect.">
+            <a:extLst>
+              <a:ext uri="{FF2B5EF4-FFF2-40B4-BE49-F238E27FC236}">
+                <a16:creationId xmlns:a16="http://schemas.microsoft.com/office/drawing/2014/main" id="{94236206-B602-E38B-5E4B-1F9662413807}"/>
+              </a:ext>
+            </a:extLst>
+          </p:cNvPr>
+          <p:cNvPicPr>
+            <a:picLocks noChangeAspect="1"/>
+          </p:cNvPicPr>
+          <p:nvPr/>
+        </p:nvPicPr>
+        <p:blipFill>
+          <a:blip r:embed="rId4">
+            <a:extLst>
+              <a:ext uri="{28A0092B-C50C-407E-A947-70E740481C1C}">
+                <a14:useLocalDpi xmlns:a14="http://schemas.microsoft.com/office/drawing/2010/main" val="0"/>
+              </a:ext>
+            </a:extLst>
+          </a:blip>
+          <a:stretch>
+            <a:fillRect/>
+          </a:stretch>
+        </p:blipFill>
+        <p:spPr>
+          <a:xfrm>
+            <a:off x="3054805" y="3146412"/>
+            <a:ext cx="475613" cy="475613"/>
+          </a:xfrm>
+          <a:prstGeom prst="rect">
+            <a:avLst/>
+          </a:prstGeom>
+          <a:ln w="6350">
+            <a:solidFill>
+              <a:schemeClr val="tx1"/>
+            </a:solidFill>
+          </a:ln>
+        </p:spPr>
+      </p:pic>
+      <p:pic>
+        <p:nvPicPr>
+          <p:cNvPr id="41" name="Picture 40" descr="A green circle with a white light&#10;&#10;AI-generated content may be incorrect.">
+            <a:extLst>
+              <a:ext uri="{FF2B5EF4-FFF2-40B4-BE49-F238E27FC236}">
+                <a16:creationId xmlns:a16="http://schemas.microsoft.com/office/drawing/2014/main" id="{E4B52365-7EAC-7134-0523-102D77FE3E2A}"/>
+              </a:ext>
+            </a:extLst>
+          </p:cNvPr>
+          <p:cNvPicPr>
+            <a:picLocks noChangeAspect="1"/>
+          </p:cNvPicPr>
+          <p:nvPr/>
+        </p:nvPicPr>
+        <p:blipFill>
+          <a:blip r:embed="rId5">
+            <a:extLst>
+              <a:ext uri="{28A0092B-C50C-407E-A947-70E740481C1C}">
+                <a14:useLocalDpi xmlns:a14="http://schemas.microsoft.com/office/drawing/2010/main" val="0"/>
+              </a:ext>
+            </a:extLst>
+          </a:blip>
+          <a:stretch>
+            <a:fillRect/>
+          </a:stretch>
+        </p:blipFill>
+        <p:spPr>
+          <a:xfrm>
+            <a:off x="1086343" y="3305608"/>
+            <a:ext cx="599185" cy="612211"/>
+          </a:xfrm>
+          <a:prstGeom prst="rect">
+            <a:avLst/>
+          </a:prstGeom>
+        </p:spPr>
+      </p:pic>
+      <p:sp>
+        <p:nvSpPr>
+          <p:cNvPr id="42" name="TextBox 41">
+            <a:extLst>
+              <a:ext uri="{FF2B5EF4-FFF2-40B4-BE49-F238E27FC236}">
+                <a16:creationId xmlns:a16="http://schemas.microsoft.com/office/drawing/2014/main" id="{779E8FA0-BA81-142C-17B1-06EA7E12F474}"/>
+              </a:ext>
+            </a:extLst>
+          </p:cNvPr>
+          <p:cNvSpPr txBox="1"/>
+          <p:nvPr/>
+        </p:nvSpPr>
+        <p:spPr>
+          <a:xfrm>
+            <a:off x="2915405" y="2809188"/>
+            <a:ext cx="2253264" cy="276999"/>
+          </a:xfrm>
+          <a:prstGeom prst="rect">
+            <a:avLst/>
+          </a:prstGeom>
+          <a:noFill/>
+        </p:spPr>
+        <p:txBody>
+          <a:bodyPr wrap="square">
+            <a:spAutoFit/>
+          </a:bodyPr>
+          <a:lstStyle/>
+          <a:p>
+            <a:r>
+              <a:rPr lang="en-US" sz="1200" b="1" dirty="0">
+                <a:solidFill>
+                  <a:schemeClr val="tx1">
+                    <a:lumMod val="75000"/>
+                    <a:lumOff val="25000"/>
+                  </a:schemeClr>
+                </a:solidFill>
+              </a:rPr>
+              <a:t>Runway Light Control PLC01</a:t>
+            </a:r>
+            <a:endParaRPr lang="en-SG" sz="1200" b="1" dirty="0">
+              <a:solidFill>
+                <a:schemeClr val="tx1">
+                  <a:lumMod val="75000"/>
+                  <a:lumOff val="25000"/>
+                </a:schemeClr>
+              </a:solidFill>
+            </a:endParaRPr>
+          </a:p>
+        </p:txBody>
+      </p:sp>
+      <p:sp>
+        <p:nvSpPr>
+          <p:cNvPr id="43" name="TextBox 42">
+            <a:extLst>
+              <a:ext uri="{FF2B5EF4-FFF2-40B4-BE49-F238E27FC236}">
+                <a16:creationId xmlns:a16="http://schemas.microsoft.com/office/drawing/2014/main" id="{42077E83-41A6-8A7A-51DE-5B9450AC068C}"/>
+              </a:ext>
+            </a:extLst>
+          </p:cNvPr>
+          <p:cNvSpPr txBox="1"/>
+          <p:nvPr/>
+        </p:nvSpPr>
+        <p:spPr>
+          <a:xfrm>
+            <a:off x="3640954" y="3146412"/>
+            <a:ext cx="1419831" cy="276999"/>
+          </a:xfrm>
+          <a:prstGeom prst="rect">
+            <a:avLst/>
+          </a:prstGeom>
+          <a:noFill/>
+        </p:spPr>
+        <p:txBody>
+          <a:bodyPr wrap="square">
+            <a:spAutoFit/>
+          </a:bodyPr>
+          <a:lstStyle/>
+          <a:p>
+            <a:r>
+              <a:rPr lang="en-US" sz="1200" b="1" dirty="0">
+                <a:solidFill>
+                  <a:schemeClr val="tx1">
+                    <a:lumMod val="75000"/>
+                    <a:lumOff val="25000"/>
+                  </a:schemeClr>
+                </a:solidFill>
+              </a:rPr>
+              <a:t>PLC Address [11]</a:t>
+            </a:r>
+            <a:endParaRPr lang="en-SG" sz="1200" b="1" dirty="0">
+              <a:solidFill>
+                <a:schemeClr val="tx1">
+                  <a:lumMod val="75000"/>
+                  <a:lumOff val="25000"/>
+                </a:schemeClr>
+              </a:solidFill>
+            </a:endParaRPr>
+          </a:p>
+        </p:txBody>
+      </p:sp>
+      <p:sp>
+        <p:nvSpPr>
+          <p:cNvPr id="44" name="Rectangle 43">
+            <a:extLst>
+              <a:ext uri="{FF2B5EF4-FFF2-40B4-BE49-F238E27FC236}">
+                <a16:creationId xmlns:a16="http://schemas.microsoft.com/office/drawing/2014/main" id="{36D6C52E-D82D-FD1F-A699-FF2CFCAA0123}"/>
+              </a:ext>
+            </a:extLst>
+          </p:cNvPr>
+          <p:cNvSpPr/>
+          <p:nvPr/>
+        </p:nvSpPr>
+        <p:spPr>
+          <a:xfrm>
+            <a:off x="3236480" y="3714207"/>
+            <a:ext cx="1671390" cy="347745"/>
+          </a:xfrm>
+          <a:prstGeom prst="rect">
+            <a:avLst/>
+          </a:prstGeom>
+        </p:spPr>
+        <p:style>
+          <a:lnRef idx="2">
+            <a:schemeClr val="accent1">
+              <a:shade val="15000"/>
+            </a:schemeClr>
+          </a:lnRef>
+          <a:fillRef idx="1">
+            <a:schemeClr val="accent1"/>
+          </a:fillRef>
+          <a:effectRef idx="0">
+            <a:schemeClr val="accent1"/>
+          </a:effectRef>
+          <a:fontRef idx="minor">
+            <a:schemeClr val="lt1"/>
+          </a:fontRef>
+        </p:style>
+        <p:txBody>
+          <a:bodyPr rtlCol="0" anchor="ctr"/>
+          <a:lstStyle/>
+          <a:p>
+            <a:pPr algn="ctr"/>
+            <a:r>
+              <a:rPr lang="en-US" sz="1200" dirty="0"/>
+              <a:t>Measurement point (M_SP_NA_1) IOA=01</a:t>
+            </a:r>
+            <a:endParaRPr lang="en-SG" sz="1200" dirty="0"/>
+          </a:p>
+        </p:txBody>
+      </p:sp>
+      <p:sp>
+        <p:nvSpPr>
+          <p:cNvPr id="45" name="Rectangle 44">
+            <a:extLst>
+              <a:ext uri="{FF2B5EF4-FFF2-40B4-BE49-F238E27FC236}">
+                <a16:creationId xmlns:a16="http://schemas.microsoft.com/office/drawing/2014/main" id="{1AC97C46-139A-7CF0-F20B-0B1CC50B8C28}"/>
+              </a:ext>
+            </a:extLst>
+          </p:cNvPr>
+          <p:cNvSpPr/>
+          <p:nvPr/>
+        </p:nvSpPr>
+        <p:spPr>
+          <a:xfrm>
+            <a:off x="3236480" y="4243317"/>
+            <a:ext cx="1671390" cy="347745"/>
+          </a:xfrm>
+          <a:prstGeom prst="rect">
+            <a:avLst/>
+          </a:prstGeom>
+        </p:spPr>
+        <p:style>
+          <a:lnRef idx="2">
+            <a:schemeClr val="accent6">
+              <a:shade val="15000"/>
+            </a:schemeClr>
+          </a:lnRef>
+          <a:fillRef idx="1">
+            <a:schemeClr val="accent6"/>
+          </a:fillRef>
+          <a:effectRef idx="0">
+            <a:schemeClr val="accent6"/>
+          </a:effectRef>
+          <a:fontRef idx="minor">
+            <a:schemeClr val="lt1"/>
+          </a:fontRef>
+        </p:style>
+        <p:txBody>
+          <a:bodyPr rtlCol="0" anchor="ctr"/>
+          <a:lstStyle/>
+          <a:p>
+            <a:pPr algn="ctr"/>
+            <a:r>
+              <a:rPr lang="en-US" sz="1200" dirty="0"/>
+              <a:t>Changeable Point (C_CR_TA_1) IOT=11</a:t>
+            </a:r>
+            <a:endParaRPr lang="en-SG" sz="1200" dirty="0"/>
+          </a:p>
+        </p:txBody>
+      </p:sp>
+      <p:cxnSp>
+        <p:nvCxnSpPr>
+          <p:cNvPr id="46" name="Connector: Elbow 45">
+            <a:extLst>
+              <a:ext uri="{FF2B5EF4-FFF2-40B4-BE49-F238E27FC236}">
+                <a16:creationId xmlns:a16="http://schemas.microsoft.com/office/drawing/2014/main" id="{95C62D46-57FE-579C-B826-24FEE896CF10}"/>
+              </a:ext>
+            </a:extLst>
+          </p:cNvPr>
+          <p:cNvCxnSpPr>
+            <a:cxnSpLocks/>
+            <a:stCxn id="45" idx="1"/>
+            <a:endCxn id="41" idx="2"/>
+          </p:cNvCxnSpPr>
+          <p:nvPr/>
+        </p:nvCxnSpPr>
+        <p:spPr>
+          <a:xfrm rot="10800000">
+            <a:off x="1385936" y="3917820"/>
+            <a:ext cx="1850544" cy="499371"/>
+          </a:xfrm>
+          <a:prstGeom prst="bentConnector2">
+            <a:avLst/>
+          </a:prstGeom>
+          <a:ln>
+            <a:solidFill>
+              <a:schemeClr val="accent6">
+                <a:lumMod val="75000"/>
+              </a:schemeClr>
+            </a:solidFill>
+          </a:ln>
+        </p:spPr>
+        <p:style>
+          <a:lnRef idx="2">
+            <a:schemeClr val="accent1"/>
+          </a:lnRef>
+          <a:fillRef idx="0">
+            <a:schemeClr val="accent1"/>
+          </a:fillRef>
+          <a:effectRef idx="1">
+            <a:schemeClr val="accent1"/>
+          </a:effectRef>
+          <a:fontRef idx="minor">
+            <a:schemeClr val="tx1"/>
+          </a:fontRef>
+        </p:style>
+      </p:cxnSp>
+      <p:cxnSp>
+        <p:nvCxnSpPr>
+          <p:cNvPr id="47" name="Straight Connector 46">
+            <a:extLst>
+              <a:ext uri="{FF2B5EF4-FFF2-40B4-BE49-F238E27FC236}">
+                <a16:creationId xmlns:a16="http://schemas.microsoft.com/office/drawing/2014/main" id="{8A5F1956-91CF-A34B-44DB-E7E66FA7F006}"/>
+              </a:ext>
+            </a:extLst>
+          </p:cNvPr>
+          <p:cNvCxnSpPr>
+            <a:cxnSpLocks/>
+            <a:stCxn id="44" idx="1"/>
+            <a:endCxn id="37" idx="2"/>
+          </p:cNvCxnSpPr>
+          <p:nvPr/>
+        </p:nvCxnSpPr>
+        <p:spPr>
+          <a:xfrm flipH="1" flipV="1">
+            <a:off x="2160111" y="3868432"/>
+            <a:ext cx="1076369" cy="19648"/>
+          </a:xfrm>
+          <a:prstGeom prst="line">
+            <a:avLst/>
+          </a:prstGeom>
+        </p:spPr>
+        <p:style>
+          <a:lnRef idx="2">
+            <a:schemeClr val="accent1"/>
+          </a:lnRef>
+          <a:fillRef idx="0">
+            <a:schemeClr val="accent1"/>
+          </a:fillRef>
+          <a:effectRef idx="1">
+            <a:schemeClr val="accent1"/>
+          </a:effectRef>
+          <a:fontRef idx="minor">
+            <a:schemeClr val="tx1"/>
+          </a:fontRef>
+        </p:style>
+      </p:cxnSp>
+      <p:sp>
+        <p:nvSpPr>
+          <p:cNvPr id="48" name="TextBox 47">
+            <a:extLst>
+              <a:ext uri="{FF2B5EF4-FFF2-40B4-BE49-F238E27FC236}">
+                <a16:creationId xmlns:a16="http://schemas.microsoft.com/office/drawing/2014/main" id="{8CAF4261-AB7D-C9A1-4FB2-3718A16B87AD}"/>
+              </a:ext>
+            </a:extLst>
+          </p:cNvPr>
+          <p:cNvSpPr txBox="1"/>
+          <p:nvPr/>
+        </p:nvSpPr>
+        <p:spPr>
+          <a:xfrm>
+            <a:off x="887095" y="3052474"/>
+            <a:ext cx="1269940" cy="276999"/>
+          </a:xfrm>
+          <a:prstGeom prst="rect">
+            <a:avLst/>
+          </a:prstGeom>
+          <a:noFill/>
+        </p:spPr>
+        <p:txBody>
+          <a:bodyPr wrap="square">
+            <a:spAutoFit/>
+          </a:bodyPr>
+          <a:lstStyle/>
+          <a:p>
+            <a:r>
+              <a:rPr lang="en-US" sz="1200" b="1" dirty="0">
+                <a:solidFill>
+                  <a:schemeClr val="tx1">
+                    <a:lumMod val="75000"/>
+                    <a:lumOff val="25000"/>
+                  </a:schemeClr>
+                </a:solidFill>
+              </a:rPr>
+              <a:t>Runway Light </a:t>
+            </a:r>
+            <a:endParaRPr lang="en-SG" sz="1200" b="1" dirty="0">
+              <a:solidFill>
+                <a:schemeClr val="tx1">
+                  <a:lumMod val="75000"/>
+                  <a:lumOff val="25000"/>
+                </a:schemeClr>
+              </a:solidFill>
+            </a:endParaRPr>
+          </a:p>
+        </p:txBody>
+      </p:sp>
+      <p:sp>
+        <p:nvSpPr>
+          <p:cNvPr id="49" name="TextBox 48">
+            <a:extLst>
+              <a:ext uri="{FF2B5EF4-FFF2-40B4-BE49-F238E27FC236}">
+                <a16:creationId xmlns:a16="http://schemas.microsoft.com/office/drawing/2014/main" id="{C4B321D6-7346-AFE3-C7BE-88C17F17D59E}"/>
+              </a:ext>
+            </a:extLst>
+          </p:cNvPr>
+          <p:cNvSpPr txBox="1"/>
+          <p:nvPr/>
+        </p:nvSpPr>
+        <p:spPr>
+          <a:xfrm>
+            <a:off x="1700747" y="3955524"/>
+            <a:ext cx="1269940" cy="461665"/>
+          </a:xfrm>
+          <a:prstGeom prst="rect">
+            <a:avLst/>
+          </a:prstGeom>
+          <a:noFill/>
+        </p:spPr>
+        <p:txBody>
+          <a:bodyPr wrap="square">
+            <a:spAutoFit/>
+          </a:bodyPr>
+          <a:lstStyle/>
+          <a:p>
+            <a:r>
+              <a:rPr lang="en-US" sz="1200" b="1" dirty="0">
+                <a:solidFill>
+                  <a:schemeClr val="tx1">
+                    <a:lumMod val="75000"/>
+                    <a:lumOff val="25000"/>
+                  </a:schemeClr>
+                </a:solidFill>
+              </a:rPr>
+              <a:t>Runway Light state sensor </a:t>
+            </a:r>
+            <a:endParaRPr lang="en-SG" sz="1200" b="1" dirty="0">
+              <a:solidFill>
+                <a:schemeClr val="tx1">
+                  <a:lumMod val="75000"/>
+                  <a:lumOff val="25000"/>
+                </a:schemeClr>
+              </a:solidFill>
+            </a:endParaRPr>
+          </a:p>
+        </p:txBody>
+      </p:sp>
+      <p:cxnSp>
+        <p:nvCxnSpPr>
+          <p:cNvPr id="50" name="Straight Arrow Connector 49">
+            <a:extLst>
+              <a:ext uri="{FF2B5EF4-FFF2-40B4-BE49-F238E27FC236}">
+                <a16:creationId xmlns:a16="http://schemas.microsoft.com/office/drawing/2014/main" id="{42BFC70B-1687-DB87-9A37-312A8C46E337}"/>
+              </a:ext>
+            </a:extLst>
+          </p:cNvPr>
+          <p:cNvCxnSpPr>
+            <a:cxnSpLocks/>
+          </p:cNvCxnSpPr>
+          <p:nvPr/>
+        </p:nvCxnSpPr>
+        <p:spPr>
+          <a:xfrm>
+            <a:off x="4907870" y="3791258"/>
+            <a:ext cx="1089244" cy="0"/>
+          </a:xfrm>
+          <a:prstGeom prst="straightConnector1">
+            <a:avLst/>
+          </a:prstGeom>
+          <a:ln>
+            <a:tailEnd type="triangle"/>
+          </a:ln>
+        </p:spPr>
+        <p:style>
+          <a:lnRef idx="2">
+            <a:schemeClr val="accent1"/>
+          </a:lnRef>
+          <a:fillRef idx="0">
+            <a:schemeClr val="accent1"/>
+          </a:fillRef>
+          <a:effectRef idx="1">
+            <a:schemeClr val="accent1"/>
+          </a:effectRef>
+          <a:fontRef idx="minor">
+            <a:schemeClr val="tx1"/>
+          </a:fontRef>
+        </p:style>
+      </p:cxnSp>
+      <p:cxnSp>
+        <p:nvCxnSpPr>
+          <p:cNvPr id="51" name="Straight Arrow Connector 50">
+            <a:extLst>
+              <a:ext uri="{FF2B5EF4-FFF2-40B4-BE49-F238E27FC236}">
+                <a16:creationId xmlns:a16="http://schemas.microsoft.com/office/drawing/2014/main" id="{4FF3243D-68D6-3AE1-7B3D-A02C323C6912}"/>
+              </a:ext>
+            </a:extLst>
+          </p:cNvPr>
+          <p:cNvCxnSpPr>
+            <a:cxnSpLocks/>
+          </p:cNvCxnSpPr>
+          <p:nvPr/>
+        </p:nvCxnSpPr>
+        <p:spPr>
+          <a:xfrm flipH="1">
+            <a:off x="6666400" y="4016262"/>
+            <a:ext cx="809224" cy="0"/>
+          </a:xfrm>
+          <a:prstGeom prst="straightConnector1">
+            <a:avLst/>
+          </a:prstGeom>
+          <a:ln>
+            <a:solidFill>
+              <a:schemeClr val="accent6">
+                <a:lumMod val="75000"/>
+              </a:schemeClr>
+            </a:solidFill>
+            <a:tailEnd type="triangle"/>
+          </a:ln>
+        </p:spPr>
+        <p:style>
+          <a:lnRef idx="2">
+            <a:schemeClr val="accent1"/>
+          </a:lnRef>
+          <a:fillRef idx="0">
+            <a:schemeClr val="accent1"/>
+          </a:fillRef>
+          <a:effectRef idx="1">
+            <a:schemeClr val="accent1"/>
+          </a:effectRef>
+          <a:fontRef idx="minor">
+            <a:schemeClr val="tx1"/>
+          </a:fontRef>
+        </p:style>
+      </p:cxnSp>
+      <p:sp>
+        <p:nvSpPr>
+          <p:cNvPr id="52" name="TextBox 51">
+            <a:extLst>
+              <a:ext uri="{FF2B5EF4-FFF2-40B4-BE49-F238E27FC236}">
+                <a16:creationId xmlns:a16="http://schemas.microsoft.com/office/drawing/2014/main" id="{239B3D55-CE03-6C33-6815-7AAEF08E8453}"/>
+              </a:ext>
+            </a:extLst>
+          </p:cNvPr>
+          <p:cNvSpPr txBox="1"/>
+          <p:nvPr/>
+        </p:nvSpPr>
+        <p:spPr>
+          <a:xfrm>
+            <a:off x="7381726" y="2738503"/>
+            <a:ext cx="2253264" cy="276999"/>
+          </a:xfrm>
+          <a:prstGeom prst="rect">
+            <a:avLst/>
+          </a:prstGeom>
+          <a:noFill/>
+        </p:spPr>
+        <p:txBody>
+          <a:bodyPr wrap="square">
+            <a:spAutoFit/>
+          </a:bodyPr>
+          <a:lstStyle/>
+          <a:p>
+            <a:r>
+              <a:rPr lang="en-US" sz="1200" b="1" dirty="0">
+                <a:solidFill>
+                  <a:schemeClr val="tx1">
+                    <a:lumMod val="75000"/>
+                    <a:lumOff val="25000"/>
+                  </a:schemeClr>
+                </a:solidFill>
+              </a:rPr>
+              <a:t>Light Control HMI</a:t>
+            </a:r>
+            <a:endParaRPr lang="en-SG" sz="1200" b="1" dirty="0">
+              <a:solidFill>
+                <a:schemeClr val="tx1">
+                  <a:lumMod val="75000"/>
+                  <a:lumOff val="25000"/>
+                </a:schemeClr>
+              </a:solidFill>
+            </a:endParaRPr>
+          </a:p>
+        </p:txBody>
+      </p:sp>
+      <p:pic>
+        <p:nvPicPr>
+          <p:cNvPr id="57" name="Picture 56">
+            <a:extLst>
+              <a:ext uri="{FF2B5EF4-FFF2-40B4-BE49-F238E27FC236}">
+                <a16:creationId xmlns:a16="http://schemas.microsoft.com/office/drawing/2014/main" id="{1BA24219-03F9-4434-F569-BA10C3893E1E}"/>
+              </a:ext>
+            </a:extLst>
+          </p:cNvPr>
+          <p:cNvPicPr>
+            <a:picLocks noChangeAspect="1"/>
+          </p:cNvPicPr>
+          <p:nvPr/>
+        </p:nvPicPr>
+        <p:blipFill>
+          <a:blip r:embed="rId8"/>
+          <a:stretch>
+            <a:fillRect/>
+          </a:stretch>
+        </p:blipFill>
+        <p:spPr>
+          <a:xfrm>
+            <a:off x="6017147" y="3689592"/>
+            <a:ext cx="698025" cy="509558"/>
+          </a:xfrm>
+          <a:prstGeom prst="rect">
+            <a:avLst/>
+          </a:prstGeom>
+          <a:ln w="12700">
+            <a:solidFill>
+              <a:schemeClr val="tx1"/>
+            </a:solidFill>
+          </a:ln>
+        </p:spPr>
+      </p:pic>
+      <p:pic>
+        <p:nvPicPr>
+          <p:cNvPr id="58" name="Picture 57">
+            <a:extLst>
+              <a:ext uri="{FF2B5EF4-FFF2-40B4-BE49-F238E27FC236}">
+                <a16:creationId xmlns:a16="http://schemas.microsoft.com/office/drawing/2014/main" id="{E334AE0E-C87B-C139-D11F-4964E9DC6997}"/>
+              </a:ext>
+            </a:extLst>
+          </p:cNvPr>
+          <p:cNvPicPr>
+            <a:picLocks noChangeAspect="1"/>
+          </p:cNvPicPr>
+          <p:nvPr/>
+        </p:nvPicPr>
+        <p:blipFill>
+          <a:blip r:embed="rId9"/>
+          <a:stretch>
+            <a:fillRect/>
+          </a:stretch>
+        </p:blipFill>
+        <p:spPr>
+          <a:xfrm>
+            <a:off x="5367354" y="5379793"/>
+            <a:ext cx="629759" cy="646331"/>
+          </a:xfrm>
+          <a:prstGeom prst="rect">
+            <a:avLst/>
+          </a:prstGeom>
+          <a:ln w="12700">
+            <a:solidFill>
+              <a:schemeClr val="accent2">
+                <a:lumMod val="75000"/>
+              </a:schemeClr>
+            </a:solidFill>
+          </a:ln>
+        </p:spPr>
+      </p:pic>
+      <p:pic>
+        <p:nvPicPr>
+          <p:cNvPr id="60" name="Picture 59">
+            <a:extLst>
+              <a:ext uri="{FF2B5EF4-FFF2-40B4-BE49-F238E27FC236}">
+                <a16:creationId xmlns:a16="http://schemas.microsoft.com/office/drawing/2014/main" id="{B3BF01ED-53F9-FB39-9DF8-B07EAFE2C615}"/>
+              </a:ext>
+            </a:extLst>
+          </p:cNvPr>
+          <p:cNvPicPr>
+            <a:picLocks noChangeAspect="1"/>
+          </p:cNvPicPr>
+          <p:nvPr/>
+        </p:nvPicPr>
+        <p:blipFill>
+          <a:blip r:embed="rId10"/>
+          <a:stretch>
+            <a:fillRect/>
+          </a:stretch>
+        </p:blipFill>
+        <p:spPr>
+          <a:xfrm>
+            <a:off x="5997113" y="5372016"/>
+            <a:ext cx="1084041" cy="415890"/>
+          </a:xfrm>
+          <a:prstGeom prst="rect">
+            <a:avLst/>
+          </a:prstGeom>
+        </p:spPr>
+      </p:pic>
+      <p:cxnSp>
+        <p:nvCxnSpPr>
+          <p:cNvPr id="62" name="Straight Arrow Connector 61">
+            <a:extLst>
+              <a:ext uri="{FF2B5EF4-FFF2-40B4-BE49-F238E27FC236}">
+                <a16:creationId xmlns:a16="http://schemas.microsoft.com/office/drawing/2014/main" id="{D61B5792-0677-1261-8109-F88B454FBE45}"/>
+              </a:ext>
+            </a:extLst>
+          </p:cNvPr>
+          <p:cNvCxnSpPr>
+            <a:cxnSpLocks/>
+          </p:cNvCxnSpPr>
+          <p:nvPr/>
+        </p:nvCxnSpPr>
+        <p:spPr>
+          <a:xfrm>
+            <a:off x="6096000" y="4169862"/>
+            <a:ext cx="0" cy="1158877"/>
+          </a:xfrm>
+          <a:prstGeom prst="straightConnector1">
+            <a:avLst/>
+          </a:prstGeom>
+          <a:ln>
+            <a:tailEnd type="triangle"/>
+          </a:ln>
+        </p:spPr>
+        <p:style>
+          <a:lnRef idx="2">
+            <a:schemeClr val="accent1"/>
+          </a:lnRef>
+          <a:fillRef idx="0">
+            <a:schemeClr val="accent1"/>
+          </a:fillRef>
+          <a:effectRef idx="1">
+            <a:schemeClr val="accent1"/>
+          </a:effectRef>
+          <a:fontRef idx="minor">
+            <a:schemeClr val="tx1"/>
+          </a:fontRef>
+        </p:style>
+      </p:cxnSp>
+      <p:cxnSp>
+        <p:nvCxnSpPr>
+          <p:cNvPr id="65" name="Straight Arrow Connector 64">
+            <a:extLst>
+              <a:ext uri="{FF2B5EF4-FFF2-40B4-BE49-F238E27FC236}">
+                <a16:creationId xmlns:a16="http://schemas.microsoft.com/office/drawing/2014/main" id="{294980D2-76F6-C960-977B-F04229E70CFF}"/>
+              </a:ext>
+            </a:extLst>
+          </p:cNvPr>
+          <p:cNvCxnSpPr>
+            <a:cxnSpLocks/>
+          </p:cNvCxnSpPr>
+          <p:nvPr/>
+        </p:nvCxnSpPr>
+        <p:spPr>
+          <a:xfrm flipH="1" flipV="1">
+            <a:off x="6259710" y="4167505"/>
+            <a:ext cx="1517" cy="1161234"/>
+          </a:xfrm>
+          <a:prstGeom prst="straightConnector1">
+            <a:avLst/>
+          </a:prstGeom>
+          <a:ln>
+            <a:prstDash val="sysDash"/>
+            <a:tailEnd type="triangle"/>
+          </a:ln>
+        </p:spPr>
+        <p:style>
+          <a:lnRef idx="2">
+            <a:schemeClr val="accent1"/>
+          </a:lnRef>
+          <a:fillRef idx="0">
+            <a:schemeClr val="accent1"/>
+          </a:fillRef>
+          <a:effectRef idx="1">
+            <a:schemeClr val="accent1"/>
+          </a:effectRef>
+          <a:fontRef idx="minor">
+            <a:schemeClr val="tx1"/>
+          </a:fontRef>
+        </p:style>
+      </p:cxnSp>
+      <p:cxnSp>
+        <p:nvCxnSpPr>
+          <p:cNvPr id="69" name="Straight Arrow Connector 68">
+            <a:extLst>
+              <a:ext uri="{FF2B5EF4-FFF2-40B4-BE49-F238E27FC236}">
+                <a16:creationId xmlns:a16="http://schemas.microsoft.com/office/drawing/2014/main" id="{052F4DA5-F415-75D6-794B-83F63A073958}"/>
+              </a:ext>
+            </a:extLst>
+          </p:cNvPr>
+          <p:cNvCxnSpPr>
+            <a:cxnSpLocks/>
+          </p:cNvCxnSpPr>
+          <p:nvPr/>
+        </p:nvCxnSpPr>
+        <p:spPr>
+          <a:xfrm>
+            <a:off x="6695139" y="3788253"/>
+            <a:ext cx="780485" cy="0"/>
+          </a:xfrm>
+          <a:prstGeom prst="straightConnector1">
+            <a:avLst/>
+          </a:prstGeom>
+          <a:ln>
+            <a:prstDash val="sysDash"/>
+            <a:tailEnd type="triangle"/>
+          </a:ln>
+        </p:spPr>
+        <p:style>
+          <a:lnRef idx="2">
+            <a:schemeClr val="accent1"/>
+          </a:lnRef>
+          <a:fillRef idx="0">
+            <a:schemeClr val="accent1"/>
+          </a:fillRef>
+          <a:effectRef idx="1">
+            <a:schemeClr val="accent1"/>
+          </a:effectRef>
+          <a:fontRef idx="minor">
+            <a:schemeClr val="tx1"/>
+          </a:fontRef>
+        </p:style>
+      </p:cxnSp>
+      <p:cxnSp>
+        <p:nvCxnSpPr>
+          <p:cNvPr id="74" name="Straight Arrow Connector 73">
+            <a:extLst>
+              <a:ext uri="{FF2B5EF4-FFF2-40B4-BE49-F238E27FC236}">
+                <a16:creationId xmlns:a16="http://schemas.microsoft.com/office/drawing/2014/main" id="{E80B64E3-A90D-E9CD-8F5D-808EE20B20AE}"/>
+              </a:ext>
+            </a:extLst>
+          </p:cNvPr>
+          <p:cNvCxnSpPr>
+            <a:cxnSpLocks/>
+          </p:cNvCxnSpPr>
+          <p:nvPr/>
+        </p:nvCxnSpPr>
+        <p:spPr>
+          <a:xfrm>
+            <a:off x="6617352" y="4208063"/>
+            <a:ext cx="0" cy="1120676"/>
+          </a:xfrm>
+          <a:prstGeom prst="straightConnector1">
+            <a:avLst/>
+          </a:prstGeom>
+          <a:ln>
+            <a:solidFill>
+              <a:schemeClr val="accent6">
+                <a:lumMod val="75000"/>
+              </a:schemeClr>
+            </a:solidFill>
+            <a:tailEnd type="triangle"/>
+          </a:ln>
+        </p:spPr>
+        <p:style>
+          <a:lnRef idx="2">
+            <a:schemeClr val="accent1"/>
+          </a:lnRef>
+          <a:fillRef idx="0">
+            <a:schemeClr val="accent1"/>
+          </a:fillRef>
+          <a:effectRef idx="1">
+            <a:schemeClr val="accent1"/>
+          </a:effectRef>
+          <a:fontRef idx="minor">
+            <a:schemeClr val="tx1"/>
+          </a:fontRef>
+        </p:style>
+      </p:cxnSp>
+      <p:cxnSp>
+        <p:nvCxnSpPr>
+          <p:cNvPr id="77" name="Straight Arrow Connector 76">
+            <a:extLst>
+              <a:ext uri="{FF2B5EF4-FFF2-40B4-BE49-F238E27FC236}">
+                <a16:creationId xmlns:a16="http://schemas.microsoft.com/office/drawing/2014/main" id="{694C6806-9A2D-C5B8-7F1A-C3C54113FCBC}"/>
+              </a:ext>
+            </a:extLst>
+          </p:cNvPr>
+          <p:cNvCxnSpPr>
+            <a:cxnSpLocks/>
+          </p:cNvCxnSpPr>
+          <p:nvPr/>
+        </p:nvCxnSpPr>
+        <p:spPr>
+          <a:xfrm flipV="1">
+            <a:off x="6453502" y="4179708"/>
+            <a:ext cx="0" cy="1149031"/>
+          </a:xfrm>
+          <a:prstGeom prst="straightConnector1">
+            <a:avLst/>
+          </a:prstGeom>
+          <a:ln>
+            <a:solidFill>
+              <a:schemeClr val="accent6">
+                <a:lumMod val="75000"/>
+              </a:schemeClr>
+            </a:solidFill>
+            <a:prstDash val="sysDash"/>
+            <a:tailEnd type="triangle"/>
+          </a:ln>
+        </p:spPr>
+        <p:style>
+          <a:lnRef idx="2">
+            <a:schemeClr val="accent1"/>
+          </a:lnRef>
+          <a:fillRef idx="0">
+            <a:schemeClr val="accent1"/>
+          </a:fillRef>
+          <a:effectRef idx="1">
+            <a:schemeClr val="accent1"/>
+          </a:effectRef>
+          <a:fontRef idx="minor">
+            <a:schemeClr val="tx1"/>
+          </a:fontRef>
+        </p:style>
+      </p:cxnSp>
+      <p:cxnSp>
+        <p:nvCxnSpPr>
+          <p:cNvPr id="86" name="Connector: Elbow 85">
+            <a:extLst>
+              <a:ext uri="{FF2B5EF4-FFF2-40B4-BE49-F238E27FC236}">
+                <a16:creationId xmlns:a16="http://schemas.microsoft.com/office/drawing/2014/main" id="{8F0C166C-41F9-8F7E-4311-A2FA19AF31DF}"/>
+              </a:ext>
+            </a:extLst>
+          </p:cNvPr>
+          <p:cNvCxnSpPr>
+            <a:endCxn id="45" idx="3"/>
+          </p:cNvCxnSpPr>
+          <p:nvPr/>
+        </p:nvCxnSpPr>
+        <p:spPr>
+          <a:xfrm rot="10800000" flipV="1">
+            <a:off x="4907871" y="4106526"/>
+            <a:ext cx="1089243" cy="310663"/>
+          </a:xfrm>
+          <a:prstGeom prst="bentConnector3">
+            <a:avLst/>
+          </a:prstGeom>
+          <a:ln>
+            <a:solidFill>
+              <a:schemeClr val="accent6">
+                <a:lumMod val="75000"/>
+              </a:schemeClr>
+            </a:solidFill>
+            <a:prstDash val="sysDash"/>
+            <a:tailEnd type="triangle"/>
+          </a:ln>
+        </p:spPr>
+        <p:style>
+          <a:lnRef idx="2">
+            <a:schemeClr val="accent1"/>
+          </a:lnRef>
+          <a:fillRef idx="0">
+            <a:schemeClr val="accent1"/>
+          </a:fillRef>
+          <a:effectRef idx="1">
+            <a:schemeClr val="accent1"/>
+          </a:effectRef>
+          <a:fontRef idx="minor">
+            <a:schemeClr val="tx1"/>
+          </a:fontRef>
+        </p:style>
+      </p:cxnSp>
+      <p:sp>
+        <p:nvSpPr>
+          <p:cNvPr id="87" name="TextBox 86">
+            <a:extLst>
+              <a:ext uri="{FF2B5EF4-FFF2-40B4-BE49-F238E27FC236}">
+                <a16:creationId xmlns:a16="http://schemas.microsoft.com/office/drawing/2014/main" id="{DFF5F91A-7750-C6C1-1DBB-7F23A9CA5639}"/>
+              </a:ext>
+            </a:extLst>
+          </p:cNvPr>
+          <p:cNvSpPr txBox="1"/>
+          <p:nvPr/>
+        </p:nvSpPr>
+        <p:spPr>
+          <a:xfrm>
+            <a:off x="5154683" y="3087418"/>
+            <a:ext cx="1089245" cy="646331"/>
+          </a:xfrm>
+          <a:prstGeom prst="rect">
+            <a:avLst/>
+          </a:prstGeom>
+          <a:noFill/>
+        </p:spPr>
+        <p:txBody>
+          <a:bodyPr wrap="square">
+            <a:spAutoFit/>
+          </a:bodyPr>
+          <a:lstStyle/>
+          <a:p>
+            <a:r>
+              <a:rPr lang="en-US" sz="1200" b="1" dirty="0">
+                <a:solidFill>
+                  <a:schemeClr val="accent1">
+                    <a:lumMod val="75000"/>
+                  </a:schemeClr>
+                </a:solidFill>
+              </a:rPr>
+              <a:t>Original Light state report data </a:t>
+            </a:r>
+            <a:endParaRPr lang="en-SG" sz="1200" b="1" dirty="0">
+              <a:solidFill>
+                <a:schemeClr val="accent1">
+                  <a:lumMod val="75000"/>
+                </a:schemeClr>
+              </a:solidFill>
+            </a:endParaRPr>
+          </a:p>
+        </p:txBody>
+      </p:sp>
+      <p:sp>
+        <p:nvSpPr>
+          <p:cNvPr id="88" name="TextBox 87">
+            <a:extLst>
+              <a:ext uri="{FF2B5EF4-FFF2-40B4-BE49-F238E27FC236}">
+                <a16:creationId xmlns:a16="http://schemas.microsoft.com/office/drawing/2014/main" id="{2C73454F-30DD-4576-B5B6-4E8701DC868D}"/>
+              </a:ext>
+            </a:extLst>
+          </p:cNvPr>
+          <p:cNvSpPr txBox="1"/>
+          <p:nvPr/>
+        </p:nvSpPr>
+        <p:spPr>
+          <a:xfrm>
+            <a:off x="6526389" y="3058112"/>
+            <a:ext cx="1089245" cy="646331"/>
+          </a:xfrm>
+          <a:prstGeom prst="rect">
+            <a:avLst/>
+          </a:prstGeom>
+          <a:noFill/>
+        </p:spPr>
+        <p:txBody>
+          <a:bodyPr wrap="square">
+            <a:spAutoFit/>
+          </a:bodyPr>
+          <a:lstStyle/>
+          <a:p>
+            <a:r>
+              <a:rPr lang="en-US" sz="1200" b="1" dirty="0">
+                <a:solidFill>
+                  <a:srgbClr val="C00000"/>
+                </a:solidFill>
+              </a:rPr>
+              <a:t>Modified Light state report data </a:t>
+            </a:r>
+            <a:endParaRPr lang="en-SG" sz="1200" b="1" dirty="0">
+              <a:solidFill>
+                <a:srgbClr val="C00000"/>
+              </a:solidFill>
+            </a:endParaRPr>
+          </a:p>
+        </p:txBody>
+      </p:sp>
+      <p:sp>
+        <p:nvSpPr>
+          <p:cNvPr id="89" name="TextBox 88">
+            <a:extLst>
+              <a:ext uri="{FF2B5EF4-FFF2-40B4-BE49-F238E27FC236}">
+                <a16:creationId xmlns:a16="http://schemas.microsoft.com/office/drawing/2014/main" id="{D3147566-C1E5-6B51-D398-E3854D21D805}"/>
+              </a:ext>
+            </a:extLst>
+          </p:cNvPr>
+          <p:cNvSpPr txBox="1"/>
+          <p:nvPr/>
+        </p:nvSpPr>
+        <p:spPr>
+          <a:xfrm>
+            <a:off x="5080133" y="4349193"/>
+            <a:ext cx="1335911" cy="646331"/>
+          </a:xfrm>
+          <a:prstGeom prst="rect">
+            <a:avLst/>
+          </a:prstGeom>
+          <a:noFill/>
+        </p:spPr>
+        <p:txBody>
+          <a:bodyPr wrap="square">
+            <a:spAutoFit/>
+          </a:bodyPr>
+          <a:lstStyle/>
+          <a:p>
+            <a:r>
+              <a:rPr lang="en-US" sz="1200" b="1" dirty="0">
+                <a:solidFill>
+                  <a:srgbClr val="C00000"/>
+                </a:solidFill>
+              </a:rPr>
+              <a:t>Modified Light state change request</a:t>
+            </a:r>
+            <a:endParaRPr lang="en-SG" sz="1200" b="1" dirty="0">
+              <a:solidFill>
+                <a:srgbClr val="C00000"/>
+              </a:solidFill>
+            </a:endParaRPr>
+          </a:p>
+        </p:txBody>
+      </p:sp>
+      <p:cxnSp>
+        <p:nvCxnSpPr>
+          <p:cNvPr id="91" name="Straight Arrow Connector 90">
+            <a:extLst>
+              <a:ext uri="{FF2B5EF4-FFF2-40B4-BE49-F238E27FC236}">
+                <a16:creationId xmlns:a16="http://schemas.microsoft.com/office/drawing/2014/main" id="{DF50CB2C-46B9-D306-4797-A010F3018E73}"/>
+              </a:ext>
+            </a:extLst>
+          </p:cNvPr>
+          <p:cNvCxnSpPr/>
+          <p:nvPr/>
+        </p:nvCxnSpPr>
+        <p:spPr>
+          <a:xfrm flipH="1" flipV="1">
+            <a:off x="4444767" y="4768401"/>
+            <a:ext cx="817800" cy="611392"/>
+          </a:xfrm>
+          <a:prstGeom prst="straightConnector1">
+            <a:avLst/>
+          </a:prstGeom>
+          <a:ln>
+            <a:solidFill>
+              <a:srgbClr val="C00000"/>
+            </a:solidFill>
+            <a:tailEnd type="triangle"/>
+          </a:ln>
+        </p:spPr>
+        <p:style>
+          <a:lnRef idx="2">
+            <a:schemeClr val="accent1"/>
+          </a:lnRef>
+          <a:fillRef idx="0">
+            <a:schemeClr val="accent1"/>
+          </a:fillRef>
+          <a:effectRef idx="1">
+            <a:schemeClr val="accent1"/>
+          </a:effectRef>
+          <a:fontRef idx="minor">
+            <a:schemeClr val="tx1"/>
+          </a:fontRef>
+        </p:style>
+      </p:cxnSp>
+      <p:cxnSp>
+        <p:nvCxnSpPr>
+          <p:cNvPr id="92" name="Straight Arrow Connector 91">
+            <a:extLst>
+              <a:ext uri="{FF2B5EF4-FFF2-40B4-BE49-F238E27FC236}">
+                <a16:creationId xmlns:a16="http://schemas.microsoft.com/office/drawing/2014/main" id="{A3E1B7F0-816D-6CF8-5436-5930144ED188}"/>
+              </a:ext>
+            </a:extLst>
+          </p:cNvPr>
+          <p:cNvCxnSpPr>
+            <a:cxnSpLocks/>
+          </p:cNvCxnSpPr>
+          <p:nvPr/>
+        </p:nvCxnSpPr>
+        <p:spPr>
+          <a:xfrm flipV="1">
+            <a:off x="7180040" y="4712175"/>
+            <a:ext cx="1110948" cy="867786"/>
+          </a:xfrm>
+          <a:prstGeom prst="straightConnector1">
+            <a:avLst/>
+          </a:prstGeom>
+          <a:ln>
+            <a:solidFill>
+              <a:srgbClr val="C00000"/>
+            </a:solidFill>
+            <a:tailEnd type="triangle"/>
+          </a:ln>
+        </p:spPr>
+        <p:style>
+          <a:lnRef idx="2">
+            <a:schemeClr val="accent1"/>
+          </a:lnRef>
+          <a:fillRef idx="0">
+            <a:schemeClr val="accent1"/>
+          </a:fillRef>
+          <a:effectRef idx="1">
+            <a:schemeClr val="accent1"/>
+          </a:effectRef>
+          <a:fontRef idx="minor">
+            <a:schemeClr val="tx1"/>
+          </a:fontRef>
+        </p:style>
+      </p:cxnSp>
+      <p:sp>
+        <p:nvSpPr>
+          <p:cNvPr id="95" name="TextBox 94">
+            <a:extLst>
+              <a:ext uri="{FF2B5EF4-FFF2-40B4-BE49-F238E27FC236}">
+                <a16:creationId xmlns:a16="http://schemas.microsoft.com/office/drawing/2014/main" id="{AF28DAFF-850D-96B8-1934-EA27A57D0282}"/>
+              </a:ext>
+            </a:extLst>
+          </p:cNvPr>
+          <p:cNvSpPr txBox="1"/>
+          <p:nvPr/>
+        </p:nvSpPr>
+        <p:spPr>
+          <a:xfrm>
+            <a:off x="7731469" y="5046905"/>
+            <a:ext cx="1335911" cy="461665"/>
+          </a:xfrm>
+          <a:prstGeom prst="rect">
+            <a:avLst/>
+          </a:prstGeom>
+          <a:noFill/>
+        </p:spPr>
+        <p:txBody>
+          <a:bodyPr wrap="square">
+            <a:spAutoFit/>
+          </a:bodyPr>
+          <a:lstStyle/>
+          <a:p>
+            <a:r>
+              <a:rPr lang="en-US" sz="1200" b="1" dirty="0">
+                <a:solidFill>
+                  <a:srgbClr val="C00000"/>
+                </a:solidFill>
+              </a:rPr>
+              <a:t>Fake ARP routing  info</a:t>
+            </a:r>
+            <a:endParaRPr lang="en-SG" sz="1200" b="1" dirty="0">
+              <a:solidFill>
+                <a:srgbClr val="C00000"/>
+              </a:solidFill>
+            </a:endParaRPr>
+          </a:p>
+        </p:txBody>
+      </p:sp>
+      <p:sp>
+        <p:nvSpPr>
+          <p:cNvPr id="96" name="TextBox 95">
+            <a:extLst>
+              <a:ext uri="{FF2B5EF4-FFF2-40B4-BE49-F238E27FC236}">
+                <a16:creationId xmlns:a16="http://schemas.microsoft.com/office/drawing/2014/main" id="{EB465BA2-DCE4-C858-C6A1-B2EB4A65DFE4}"/>
+              </a:ext>
+            </a:extLst>
+          </p:cNvPr>
+          <p:cNvSpPr txBox="1"/>
+          <p:nvPr/>
+        </p:nvSpPr>
+        <p:spPr>
+          <a:xfrm>
+            <a:off x="3796437" y="4931299"/>
+            <a:ext cx="1335911" cy="461665"/>
+          </a:xfrm>
+          <a:prstGeom prst="rect">
+            <a:avLst/>
+          </a:prstGeom>
+          <a:noFill/>
+        </p:spPr>
+        <p:txBody>
+          <a:bodyPr wrap="square">
+            <a:spAutoFit/>
+          </a:bodyPr>
+          <a:lstStyle/>
+          <a:p>
+            <a:r>
+              <a:rPr lang="en-US" sz="1200" b="1" dirty="0">
+                <a:solidFill>
+                  <a:srgbClr val="C00000"/>
+                </a:solidFill>
+              </a:rPr>
+              <a:t>Fake ARP routing  info</a:t>
+            </a:r>
+            <a:endParaRPr lang="en-SG" sz="1200" b="1" dirty="0">
+              <a:solidFill>
+                <a:srgbClr val="C00000"/>
+              </a:solidFill>
+            </a:endParaRPr>
+          </a:p>
+        </p:txBody>
+      </p:sp>
+      <p:sp>
+        <p:nvSpPr>
+          <p:cNvPr id="97" name="TextBox 96">
+            <a:extLst>
+              <a:ext uri="{FF2B5EF4-FFF2-40B4-BE49-F238E27FC236}">
+                <a16:creationId xmlns:a16="http://schemas.microsoft.com/office/drawing/2014/main" id="{CBF3C758-99C1-605A-6D49-C2D5C60043BF}"/>
+              </a:ext>
+            </a:extLst>
+          </p:cNvPr>
+          <p:cNvSpPr txBox="1"/>
+          <p:nvPr/>
+        </p:nvSpPr>
+        <p:spPr>
+          <a:xfrm>
+            <a:off x="5995548" y="5818756"/>
+            <a:ext cx="1735922" cy="461665"/>
+          </a:xfrm>
+          <a:prstGeom prst="rect">
+            <a:avLst/>
+          </a:prstGeom>
+          <a:noFill/>
+        </p:spPr>
+        <p:txBody>
+          <a:bodyPr wrap="square">
+            <a:spAutoFit/>
+          </a:bodyPr>
+          <a:lstStyle/>
+          <a:p>
+            <a:r>
+              <a:rPr lang="en-US" sz="1200" b="1" dirty="0">
+                <a:solidFill>
+                  <a:srgbClr val="C00000"/>
+                </a:solidFill>
+              </a:rPr>
+              <a:t>Attack media IoT camera run Ettercap </a:t>
+            </a:r>
+            <a:endParaRPr lang="en-SG" sz="1200" b="1" dirty="0">
+              <a:solidFill>
+                <a:srgbClr val="C00000"/>
+              </a:solidFill>
+            </a:endParaRPr>
+          </a:p>
+        </p:txBody>
+      </p:sp>
+      <p:pic>
+        <p:nvPicPr>
+          <p:cNvPr id="98" name="Graphic 97" descr="Target with solid fill">
+            <a:extLst>
+              <a:ext uri="{FF2B5EF4-FFF2-40B4-BE49-F238E27FC236}">
+                <a16:creationId xmlns:a16="http://schemas.microsoft.com/office/drawing/2014/main" id="{DCB3E2F4-ECBC-C56C-9EFE-D3C3FC9FCCD8}"/>
+              </a:ext>
+            </a:extLst>
+          </p:cNvPr>
+          <p:cNvPicPr>
+            <a:picLocks noChangeAspect="1"/>
+          </p:cNvPicPr>
+          <p:nvPr/>
+        </p:nvPicPr>
+        <p:blipFill>
+          <a:blip r:embed="rId6">
+            <a:extLst>
+              <a:ext uri="{96DAC541-7B7A-43D3-8B79-37D633B846F1}">
+                <asvg:svgBlip xmlns:asvg="http://schemas.microsoft.com/office/drawing/2016/SVG/main" r:embed="rId7"/>
+              </a:ext>
+            </a:extLst>
+          </a:blip>
+          <a:stretch>
+            <a:fillRect/>
+          </a:stretch>
+        </p:blipFill>
+        <p:spPr>
+          <a:xfrm>
+            <a:off x="5235516" y="1815371"/>
+            <a:ext cx="485715" cy="485715"/>
+          </a:xfrm>
+          <a:prstGeom prst="rect">
+            <a:avLst/>
+          </a:prstGeom>
+        </p:spPr>
+      </p:pic>
+      <p:sp>
+        <p:nvSpPr>
+          <p:cNvPr id="99" name="Arrow: Down 98">
+            <a:extLst>
+              <a:ext uri="{FF2B5EF4-FFF2-40B4-BE49-F238E27FC236}">
+                <a16:creationId xmlns:a16="http://schemas.microsoft.com/office/drawing/2014/main" id="{6BB62D73-01A7-F26B-F017-F167791E4800}"/>
+              </a:ext>
+            </a:extLst>
+          </p:cNvPr>
+          <p:cNvSpPr/>
+          <p:nvPr/>
+        </p:nvSpPr>
+        <p:spPr>
+          <a:xfrm>
+            <a:off x="6243928" y="2357471"/>
+            <a:ext cx="321668" cy="550598"/>
+          </a:xfrm>
+          <a:prstGeom prst="downArrow">
+            <a:avLst/>
+          </a:prstGeom>
+          <a:solidFill>
+            <a:srgbClr val="C00000"/>
+          </a:solidFill>
+        </p:spPr>
+        <p:style>
+          <a:lnRef idx="2">
+            <a:schemeClr val="accent1">
+              <a:shade val="15000"/>
+            </a:schemeClr>
+          </a:lnRef>
+          <a:fillRef idx="1">
+            <a:schemeClr val="accent1"/>
+          </a:fillRef>
+          <a:effectRef idx="0">
+            <a:schemeClr val="accent1"/>
+          </a:effectRef>
+          <a:fontRef idx="minor">
+            <a:schemeClr val="lt1"/>
+          </a:fontRef>
+        </p:style>
+        <p:txBody>
+          <a:bodyPr rtlCol="0" anchor="ctr"/>
+          <a:lstStyle/>
+          <a:p>
+            <a:pPr algn="ctr"/>
+            <a:endParaRPr lang="en-SG" dirty="0"/>
+          </a:p>
+        </p:txBody>
+      </p:sp>
+    </p:spTree>
+    <p:extLst>
+      <p:ext uri="{BB962C8B-B14F-4D97-AF65-F5344CB8AC3E}">
+        <p14:creationId xmlns:p14="http://schemas.microsoft.com/office/powerpoint/2010/main" val="2236589681"/>
       </p:ext>
     </p:extLst>
   </p:cSld>

</xml_diff>

<commit_message>
update the mitm attack observation section.
</commit_message>
<xml_diff>
--- a/5_Case_Study_Doc/2_CaseStudy_MITM_Img/designDoc.pptx
+++ b/5_Case_Study_Doc/2_CaseStudy_MITM_Img/designDoc.pptx
@@ -5,12 +5,15 @@
     <p:sldMasterId id="2147483648" r:id="rId1"/>
   </p:sldMasterIdLst>
   <p:notesMasterIdLst>
-    <p:notesMasterId r:id="rId5"/>
+    <p:notesMasterId r:id="rId8"/>
   </p:notesMasterIdLst>
   <p:sldIdLst>
     <p:sldId id="272" r:id="rId2"/>
     <p:sldId id="271" r:id="rId3"/>
     <p:sldId id="273" r:id="rId4"/>
+    <p:sldId id="274" r:id="rId5"/>
+    <p:sldId id="275" r:id="rId6"/>
+    <p:sldId id="276" r:id="rId7"/>
   </p:sldIdLst>
   <p:sldSz cx="12192000" cy="6858000"/>
   <p:notesSz cx="6858000" cy="9144000"/>
@@ -17775,6 +17778,2140 @@
     <p:extLst>
       <p:ext uri="{BB962C8B-B14F-4D97-AF65-F5344CB8AC3E}">
         <p14:creationId xmlns:p14="http://schemas.microsoft.com/office/powerpoint/2010/main" val="2236589681"/>
+      </p:ext>
+    </p:extLst>
+  </p:cSld>
+  <p:clrMapOvr>
+    <a:masterClrMapping/>
+  </p:clrMapOvr>
+</p:sld>
+</file>
+
+<file path=ppt/slides/slide4.xml><?xml version="1.0" encoding="utf-8"?>
+<p:sld xmlns:a="http://schemas.openxmlformats.org/drawingml/2006/main" xmlns:r="http://schemas.openxmlformats.org/officeDocument/2006/relationships" xmlns:p="http://schemas.openxmlformats.org/presentationml/2006/main">
+  <p:cSld>
+    <p:spTree>
+      <p:nvGrpSpPr>
+        <p:cNvPr id="1" name=""/>
+        <p:cNvGrpSpPr/>
+        <p:nvPr/>
+      </p:nvGrpSpPr>
+      <p:grpSpPr>
+        <a:xfrm>
+          <a:off x="0" y="0"/>
+          <a:ext cx="0" cy="0"/>
+          <a:chOff x="0" y="0"/>
+          <a:chExt cx="0" cy="0"/>
+        </a:xfrm>
+      </p:grpSpPr>
+      <p:pic>
+        <p:nvPicPr>
+          <p:cNvPr id="5" name="Picture 4">
+            <a:extLst>
+              <a:ext uri="{FF2B5EF4-FFF2-40B4-BE49-F238E27FC236}">
+                <a16:creationId xmlns:a16="http://schemas.microsoft.com/office/drawing/2014/main" id="{561CDF0A-21F8-3CA8-92FC-0BBB4CF407B1}"/>
+              </a:ext>
+            </a:extLst>
+          </p:cNvPr>
+          <p:cNvPicPr>
+            <a:picLocks noChangeAspect="1"/>
+          </p:cNvPicPr>
+          <p:nvPr/>
+        </p:nvPicPr>
+        <p:blipFill>
+          <a:blip r:embed="rId2"/>
+          <a:stretch>
+            <a:fillRect/>
+          </a:stretch>
+        </p:blipFill>
+        <p:spPr>
+          <a:xfrm>
+            <a:off x="2175761" y="603250"/>
+            <a:ext cx="7142857" cy="2047619"/>
+          </a:xfrm>
+          <a:prstGeom prst="rect">
+            <a:avLst/>
+          </a:prstGeom>
+        </p:spPr>
+      </p:pic>
+      <p:pic>
+        <p:nvPicPr>
+          <p:cNvPr id="7" name="Picture 6">
+            <a:extLst>
+              <a:ext uri="{FF2B5EF4-FFF2-40B4-BE49-F238E27FC236}">
+                <a16:creationId xmlns:a16="http://schemas.microsoft.com/office/drawing/2014/main" id="{22C57B37-AB1C-9386-05B7-FC3309D750BF}"/>
+              </a:ext>
+            </a:extLst>
+          </p:cNvPr>
+          <p:cNvPicPr>
+            <a:picLocks noChangeAspect="1"/>
+          </p:cNvPicPr>
+          <p:nvPr/>
+        </p:nvPicPr>
+        <p:blipFill>
+          <a:blip r:embed="rId3"/>
+          <a:srcRect l="41307"/>
+          <a:stretch>
+            <a:fillRect/>
+          </a:stretch>
+        </p:blipFill>
+        <p:spPr>
+          <a:xfrm>
+            <a:off x="5556226" y="3067765"/>
+            <a:ext cx="3214144" cy="2542857"/>
+          </a:xfrm>
+          <a:prstGeom prst="rect">
+            <a:avLst/>
+          </a:prstGeom>
+          <a:ln w="6350">
+            <a:solidFill>
+              <a:schemeClr val="tx1"/>
+            </a:solidFill>
+          </a:ln>
+        </p:spPr>
+      </p:pic>
+      <p:pic>
+        <p:nvPicPr>
+          <p:cNvPr id="9" name="Picture 8">
+            <a:extLst>
+              <a:ext uri="{FF2B5EF4-FFF2-40B4-BE49-F238E27FC236}">
+                <a16:creationId xmlns:a16="http://schemas.microsoft.com/office/drawing/2014/main" id="{36411B0D-C688-F917-6DFA-3441B33BE02C}"/>
+              </a:ext>
+            </a:extLst>
+          </p:cNvPr>
+          <p:cNvPicPr>
+            <a:picLocks noChangeAspect="1"/>
+          </p:cNvPicPr>
+          <p:nvPr/>
+        </p:nvPicPr>
+        <p:blipFill>
+          <a:blip r:embed="rId4"/>
+          <a:stretch>
+            <a:fillRect/>
+          </a:stretch>
+        </p:blipFill>
+        <p:spPr>
+          <a:xfrm>
+            <a:off x="814896" y="3584590"/>
+            <a:ext cx="4478510" cy="2047619"/>
+          </a:xfrm>
+          <a:prstGeom prst="rect">
+            <a:avLst/>
+          </a:prstGeom>
+        </p:spPr>
+      </p:pic>
+      <p:pic>
+        <p:nvPicPr>
+          <p:cNvPr id="11" name="Picture 10">
+            <a:extLst>
+              <a:ext uri="{FF2B5EF4-FFF2-40B4-BE49-F238E27FC236}">
+                <a16:creationId xmlns:a16="http://schemas.microsoft.com/office/drawing/2014/main" id="{0E166C39-7AE6-6484-1686-4A556F48C82E}"/>
+              </a:ext>
+            </a:extLst>
+          </p:cNvPr>
+          <p:cNvPicPr>
+            <a:picLocks noChangeAspect="1"/>
+          </p:cNvPicPr>
+          <p:nvPr/>
+        </p:nvPicPr>
+        <p:blipFill>
+          <a:blip r:embed="rId5"/>
+          <a:stretch>
+            <a:fillRect/>
+          </a:stretch>
+        </p:blipFill>
+        <p:spPr>
+          <a:xfrm>
+            <a:off x="9238890" y="3067765"/>
+            <a:ext cx="1349565" cy="2445620"/>
+          </a:xfrm>
+          <a:prstGeom prst="rect">
+            <a:avLst/>
+          </a:prstGeom>
+        </p:spPr>
+      </p:pic>
+      <p:sp>
+        <p:nvSpPr>
+          <p:cNvPr id="12" name="TextBox 11">
+            <a:extLst>
+              <a:ext uri="{FF2B5EF4-FFF2-40B4-BE49-F238E27FC236}">
+                <a16:creationId xmlns:a16="http://schemas.microsoft.com/office/drawing/2014/main" id="{3AAED491-7F48-5713-FC92-DA91D54D3077}"/>
+              </a:ext>
+            </a:extLst>
+          </p:cNvPr>
+          <p:cNvSpPr txBox="1"/>
+          <p:nvPr/>
+        </p:nvSpPr>
+        <p:spPr>
+          <a:xfrm>
+            <a:off x="861884" y="1260877"/>
+            <a:ext cx="1313877" cy="1077218"/>
+          </a:xfrm>
+          <a:prstGeom prst="rect">
+            <a:avLst/>
+          </a:prstGeom>
+          <a:noFill/>
+        </p:spPr>
+        <p:txBody>
+          <a:bodyPr wrap="square">
+            <a:spAutoFit/>
+          </a:bodyPr>
+          <a:lstStyle/>
+          <a:p>
+            <a:r>
+              <a:rPr lang="en-US" sz="1600" b="1" dirty="0"/>
+              <a:t>Physical world Take off Holding light turn off </a:t>
+            </a:r>
+            <a:endParaRPr lang="en-SG" sz="1600" b="1" dirty="0"/>
+          </a:p>
+        </p:txBody>
+      </p:sp>
+      <p:cxnSp>
+        <p:nvCxnSpPr>
+          <p:cNvPr id="14" name="Straight Arrow Connector 13">
+            <a:extLst>
+              <a:ext uri="{FF2B5EF4-FFF2-40B4-BE49-F238E27FC236}">
+                <a16:creationId xmlns:a16="http://schemas.microsoft.com/office/drawing/2014/main" id="{E100E2BB-CB61-84BD-1403-F6AD4B3E6B50}"/>
+              </a:ext>
+            </a:extLst>
+          </p:cNvPr>
+          <p:cNvCxnSpPr/>
+          <p:nvPr/>
+        </p:nvCxnSpPr>
+        <p:spPr>
+          <a:xfrm>
+            <a:off x="2606040" y="2650869"/>
+            <a:ext cx="0" cy="1582803"/>
+          </a:xfrm>
+          <a:prstGeom prst="straightConnector1">
+            <a:avLst/>
+          </a:prstGeom>
+          <a:ln w="38100">
+            <a:solidFill>
+              <a:srgbClr val="FF0000"/>
+            </a:solidFill>
+            <a:prstDash val="sysDash"/>
+            <a:tailEnd type="triangle"/>
+          </a:ln>
+        </p:spPr>
+        <p:style>
+          <a:lnRef idx="2">
+            <a:schemeClr val="accent1"/>
+          </a:lnRef>
+          <a:fillRef idx="0">
+            <a:schemeClr val="accent1"/>
+          </a:fillRef>
+          <a:effectRef idx="1">
+            <a:schemeClr val="accent1"/>
+          </a:effectRef>
+          <a:fontRef idx="minor">
+            <a:schemeClr val="tx1"/>
+          </a:fontRef>
+        </p:style>
+      </p:cxnSp>
+      <p:sp>
+        <p:nvSpPr>
+          <p:cNvPr id="16" name="TextBox 15">
+            <a:extLst>
+              <a:ext uri="{FF2B5EF4-FFF2-40B4-BE49-F238E27FC236}">
+                <a16:creationId xmlns:a16="http://schemas.microsoft.com/office/drawing/2014/main" id="{63ECBF28-58D4-5BF8-2DF9-DA7BDDECC8C7}"/>
+              </a:ext>
+            </a:extLst>
+          </p:cNvPr>
+          <p:cNvSpPr txBox="1"/>
+          <p:nvPr/>
+        </p:nvSpPr>
+        <p:spPr>
+          <a:xfrm>
+            <a:off x="814896" y="2753593"/>
+            <a:ext cx="2124967" cy="830997"/>
+          </a:xfrm>
+          <a:prstGeom prst="rect">
+            <a:avLst/>
+          </a:prstGeom>
+          <a:noFill/>
+        </p:spPr>
+        <p:txBody>
+          <a:bodyPr wrap="square">
+            <a:spAutoFit/>
+          </a:bodyPr>
+          <a:lstStyle/>
+          <a:p>
+            <a:r>
+              <a:rPr lang="en-US" sz="1600" b="1" dirty="0"/>
+              <a:t>HMI runway state panel no take off indicator light up</a:t>
+            </a:r>
+            <a:endParaRPr lang="en-SG" sz="1600" b="1" dirty="0"/>
+          </a:p>
+        </p:txBody>
+      </p:sp>
+      <p:cxnSp>
+        <p:nvCxnSpPr>
+          <p:cNvPr id="17" name="Straight Arrow Connector 16">
+            <a:extLst>
+              <a:ext uri="{FF2B5EF4-FFF2-40B4-BE49-F238E27FC236}">
+                <a16:creationId xmlns:a16="http://schemas.microsoft.com/office/drawing/2014/main" id="{F4FE9CD9-A827-269F-502D-8E082551631B}"/>
+              </a:ext>
+            </a:extLst>
+          </p:cNvPr>
+          <p:cNvCxnSpPr>
+            <a:cxnSpLocks/>
+          </p:cNvCxnSpPr>
+          <p:nvPr/>
+        </p:nvCxnSpPr>
+        <p:spPr>
+          <a:xfrm>
+            <a:off x="6184046" y="2632580"/>
+            <a:ext cx="737962" cy="1902844"/>
+          </a:xfrm>
+          <a:prstGeom prst="straightConnector1">
+            <a:avLst/>
+          </a:prstGeom>
+          <a:ln w="38100">
+            <a:solidFill>
+              <a:srgbClr val="FF0000"/>
+            </a:solidFill>
+            <a:prstDash val="sysDash"/>
+            <a:tailEnd type="triangle"/>
+          </a:ln>
+        </p:spPr>
+        <p:style>
+          <a:lnRef idx="2">
+            <a:schemeClr val="accent1"/>
+          </a:lnRef>
+          <a:fillRef idx="0">
+            <a:schemeClr val="accent1"/>
+          </a:fillRef>
+          <a:effectRef idx="1">
+            <a:schemeClr val="accent1"/>
+          </a:effectRef>
+          <a:fontRef idx="minor">
+            <a:schemeClr val="tx1"/>
+          </a:fontRef>
+        </p:style>
+      </p:cxnSp>
+      <p:sp>
+        <p:nvSpPr>
+          <p:cNvPr id="19" name="TextBox 18">
+            <a:extLst>
+              <a:ext uri="{FF2B5EF4-FFF2-40B4-BE49-F238E27FC236}">
+                <a16:creationId xmlns:a16="http://schemas.microsoft.com/office/drawing/2014/main" id="{082754E7-1C50-4295-25D0-83BCBC7243F6}"/>
+              </a:ext>
+            </a:extLst>
+          </p:cNvPr>
+          <p:cNvSpPr txBox="1"/>
+          <p:nvPr/>
+        </p:nvSpPr>
+        <p:spPr>
+          <a:xfrm>
+            <a:off x="4280966" y="2632580"/>
+            <a:ext cx="1903080" cy="830997"/>
+          </a:xfrm>
+          <a:prstGeom prst="rect">
+            <a:avLst/>
+          </a:prstGeom>
+          <a:noFill/>
+        </p:spPr>
+        <p:txBody>
+          <a:bodyPr wrap="square">
+            <a:spAutoFit/>
+          </a:bodyPr>
+          <a:lstStyle/>
+          <a:p>
+            <a:r>
+              <a:rPr lang="en-US" sz="1600" b="1" dirty="0"/>
+              <a:t>HMI light control panel shows power off state</a:t>
+            </a:r>
+            <a:endParaRPr lang="en-SG" sz="1600" b="1" dirty="0"/>
+          </a:p>
+        </p:txBody>
+      </p:sp>
+      <p:cxnSp>
+        <p:nvCxnSpPr>
+          <p:cNvPr id="21" name="Straight Arrow Connector 20">
+            <a:extLst>
+              <a:ext uri="{FF2B5EF4-FFF2-40B4-BE49-F238E27FC236}">
+                <a16:creationId xmlns:a16="http://schemas.microsoft.com/office/drawing/2014/main" id="{F96D14E9-4AC8-AA18-09CB-D66EC19DD4FF}"/>
+              </a:ext>
+            </a:extLst>
+          </p:cNvPr>
+          <p:cNvCxnSpPr>
+            <a:cxnSpLocks/>
+          </p:cNvCxnSpPr>
+          <p:nvPr/>
+        </p:nvCxnSpPr>
+        <p:spPr>
+          <a:xfrm>
+            <a:off x="8565589" y="2650869"/>
+            <a:ext cx="924181" cy="2433195"/>
+          </a:xfrm>
+          <a:prstGeom prst="straightConnector1">
+            <a:avLst/>
+          </a:prstGeom>
+          <a:ln w="38100">
+            <a:solidFill>
+              <a:srgbClr val="FF0000"/>
+            </a:solidFill>
+            <a:prstDash val="sysDash"/>
+            <a:tailEnd type="triangle"/>
+          </a:ln>
+        </p:spPr>
+        <p:style>
+          <a:lnRef idx="2">
+            <a:schemeClr val="accent1"/>
+          </a:lnRef>
+          <a:fillRef idx="0">
+            <a:schemeClr val="accent1"/>
+          </a:fillRef>
+          <a:effectRef idx="1">
+            <a:schemeClr val="accent1"/>
+          </a:effectRef>
+          <a:fontRef idx="minor">
+            <a:schemeClr val="tx1"/>
+          </a:fontRef>
+        </p:style>
+      </p:cxnSp>
+      <p:sp>
+        <p:nvSpPr>
+          <p:cNvPr id="23" name="TextBox 22">
+            <a:extLst>
+              <a:ext uri="{FF2B5EF4-FFF2-40B4-BE49-F238E27FC236}">
+                <a16:creationId xmlns:a16="http://schemas.microsoft.com/office/drawing/2014/main" id="{49177CD6-7CE2-E9BA-B317-996BDC636ED6}"/>
+              </a:ext>
+            </a:extLst>
+          </p:cNvPr>
+          <p:cNvSpPr txBox="1"/>
+          <p:nvPr/>
+        </p:nvSpPr>
+        <p:spPr>
+          <a:xfrm>
+            <a:off x="9318619" y="2329373"/>
+            <a:ext cx="1105542" cy="584775"/>
+          </a:xfrm>
+          <a:prstGeom prst="rect">
+            <a:avLst/>
+          </a:prstGeom>
+          <a:noFill/>
+        </p:spPr>
+        <p:txBody>
+          <a:bodyPr wrap="square">
+            <a:spAutoFit/>
+          </a:bodyPr>
+          <a:lstStyle/>
+          <a:p>
+            <a:r>
+              <a:rPr lang="en-US" sz="1600" b="1" dirty="0"/>
+              <a:t>No Alert Indicator </a:t>
+            </a:r>
+            <a:endParaRPr lang="en-SG" sz="1600" b="1" dirty="0"/>
+          </a:p>
+        </p:txBody>
+      </p:sp>
+      <p:sp>
+        <p:nvSpPr>
+          <p:cNvPr id="24" name="TextBox 23">
+            <a:extLst>
+              <a:ext uri="{FF2B5EF4-FFF2-40B4-BE49-F238E27FC236}">
+                <a16:creationId xmlns:a16="http://schemas.microsoft.com/office/drawing/2014/main" id="{CA4A7546-1824-F483-080A-77A82FDAA183}"/>
+              </a:ext>
+            </a:extLst>
+          </p:cNvPr>
+          <p:cNvSpPr txBox="1"/>
+          <p:nvPr/>
+        </p:nvSpPr>
+        <p:spPr>
+          <a:xfrm>
+            <a:off x="861884" y="278892"/>
+            <a:ext cx="2972500" cy="338554"/>
+          </a:xfrm>
+          <a:prstGeom prst="rect">
+            <a:avLst/>
+          </a:prstGeom>
+          <a:noFill/>
+        </p:spPr>
+        <p:txBody>
+          <a:bodyPr wrap="square">
+            <a:spAutoFit/>
+          </a:bodyPr>
+          <a:lstStyle/>
+          <a:p>
+            <a:r>
+              <a:rPr lang="en-US" sz="1600" b="1" dirty="0">
+                <a:solidFill>
+                  <a:schemeClr val="accent6">
+                    <a:lumMod val="75000"/>
+                  </a:schemeClr>
+                </a:solidFill>
+              </a:rPr>
+              <a:t>Normal state: Take off allow </a:t>
+            </a:r>
+            <a:endParaRPr lang="en-SG" sz="1600" b="1" dirty="0">
+              <a:solidFill>
+                <a:schemeClr val="accent6">
+                  <a:lumMod val="75000"/>
+                </a:schemeClr>
+              </a:solidFill>
+            </a:endParaRPr>
+          </a:p>
+        </p:txBody>
+      </p:sp>
+    </p:spTree>
+    <p:extLst>
+      <p:ext uri="{BB962C8B-B14F-4D97-AF65-F5344CB8AC3E}">
+        <p14:creationId xmlns:p14="http://schemas.microsoft.com/office/powerpoint/2010/main" val="1920855565"/>
+      </p:ext>
+    </p:extLst>
+  </p:cSld>
+  <p:clrMapOvr>
+    <a:masterClrMapping/>
+  </p:clrMapOvr>
+</p:sld>
+</file>
+
+<file path=ppt/slides/slide5.xml><?xml version="1.0" encoding="utf-8"?>
+<p:sld xmlns:a="http://schemas.openxmlformats.org/drawingml/2006/main" xmlns:r="http://schemas.openxmlformats.org/officeDocument/2006/relationships" xmlns:p="http://schemas.openxmlformats.org/presentationml/2006/main">
+  <p:cSld>
+    <p:spTree>
+      <p:nvGrpSpPr>
+        <p:cNvPr id="1" name=""/>
+        <p:cNvGrpSpPr/>
+        <p:nvPr/>
+      </p:nvGrpSpPr>
+      <p:grpSpPr>
+        <a:xfrm>
+          <a:off x="0" y="0"/>
+          <a:ext cx="0" cy="0"/>
+          <a:chOff x="0" y="0"/>
+          <a:chExt cx="0" cy="0"/>
+        </a:xfrm>
+      </p:grpSpPr>
+      <p:pic>
+        <p:nvPicPr>
+          <p:cNvPr id="5" name="Content Placeholder 4">
+            <a:extLst>
+              <a:ext uri="{FF2B5EF4-FFF2-40B4-BE49-F238E27FC236}">
+                <a16:creationId xmlns:a16="http://schemas.microsoft.com/office/drawing/2014/main" id="{97792EF4-B97F-6119-A0E8-8ADAD9C2F60F}"/>
+              </a:ext>
+            </a:extLst>
+          </p:cNvPr>
+          <p:cNvPicPr>
+            <a:picLocks noGrp="1" noChangeAspect="1"/>
+          </p:cNvPicPr>
+          <p:nvPr>
+            <p:ph idx="1"/>
+          </p:nvPr>
+        </p:nvPicPr>
+        <p:blipFill>
+          <a:blip r:embed="rId2"/>
+          <a:stretch>
+            <a:fillRect/>
+          </a:stretch>
+        </p:blipFill>
+        <p:spPr>
+          <a:xfrm>
+            <a:off x="730178" y="1173122"/>
+            <a:ext cx="2633873" cy="1350973"/>
+          </a:xfrm>
+          <a:prstGeom prst="rect">
+            <a:avLst/>
+          </a:prstGeom>
+          <a:ln w="9525">
+            <a:solidFill>
+              <a:schemeClr val="tx1"/>
+            </a:solidFill>
+          </a:ln>
+        </p:spPr>
+      </p:pic>
+      <p:pic>
+        <p:nvPicPr>
+          <p:cNvPr id="7" name="Picture 6">
+            <a:extLst>
+              <a:ext uri="{FF2B5EF4-FFF2-40B4-BE49-F238E27FC236}">
+                <a16:creationId xmlns:a16="http://schemas.microsoft.com/office/drawing/2014/main" id="{CB9AB5CD-376A-619D-52D9-6CE6DD1932B0}"/>
+              </a:ext>
+            </a:extLst>
+          </p:cNvPr>
+          <p:cNvPicPr>
+            <a:picLocks noChangeAspect="1"/>
+          </p:cNvPicPr>
+          <p:nvPr/>
+        </p:nvPicPr>
+        <p:blipFill>
+          <a:blip r:embed="rId3"/>
+          <a:stretch>
+            <a:fillRect/>
+          </a:stretch>
+        </p:blipFill>
+        <p:spPr>
+          <a:xfrm>
+            <a:off x="2773827" y="3149537"/>
+            <a:ext cx="3784054" cy="1788245"/>
+          </a:xfrm>
+          <a:prstGeom prst="rect">
+            <a:avLst/>
+          </a:prstGeom>
+        </p:spPr>
+      </p:pic>
+      <p:pic>
+        <p:nvPicPr>
+          <p:cNvPr id="9" name="Picture 8">
+            <a:extLst>
+              <a:ext uri="{FF2B5EF4-FFF2-40B4-BE49-F238E27FC236}">
+                <a16:creationId xmlns:a16="http://schemas.microsoft.com/office/drawing/2014/main" id="{5586C3DD-1AA7-2789-EEBB-27DCF7687F4E}"/>
+              </a:ext>
+            </a:extLst>
+          </p:cNvPr>
+          <p:cNvPicPr>
+            <a:picLocks noChangeAspect="1"/>
+          </p:cNvPicPr>
+          <p:nvPr/>
+        </p:nvPicPr>
+        <p:blipFill>
+          <a:blip r:embed="rId4"/>
+          <a:stretch>
+            <a:fillRect/>
+          </a:stretch>
+        </p:blipFill>
+        <p:spPr>
+          <a:xfrm>
+            <a:off x="7271722" y="3653886"/>
+            <a:ext cx="2589812" cy="1213122"/>
+          </a:xfrm>
+          <a:prstGeom prst="rect">
+            <a:avLst/>
+          </a:prstGeom>
+          <a:ln w="9525">
+            <a:solidFill>
+              <a:schemeClr val="tx1"/>
+            </a:solidFill>
+          </a:ln>
+        </p:spPr>
+      </p:pic>
+      <p:pic>
+        <p:nvPicPr>
+          <p:cNvPr id="11" name="Picture 10">
+            <a:extLst>
+              <a:ext uri="{FF2B5EF4-FFF2-40B4-BE49-F238E27FC236}">
+                <a16:creationId xmlns:a16="http://schemas.microsoft.com/office/drawing/2014/main" id="{996A087C-A023-BCEC-1D06-D6EA28DC648C}"/>
+              </a:ext>
+            </a:extLst>
+          </p:cNvPr>
+          <p:cNvPicPr>
+            <a:picLocks noChangeAspect="1"/>
+          </p:cNvPicPr>
+          <p:nvPr/>
+        </p:nvPicPr>
+        <p:blipFill>
+          <a:blip r:embed="rId5"/>
+          <a:stretch>
+            <a:fillRect/>
+          </a:stretch>
+        </p:blipFill>
+        <p:spPr>
+          <a:xfrm>
+            <a:off x="730178" y="2842766"/>
+            <a:ext cx="1329809" cy="2119595"/>
+          </a:xfrm>
+          <a:prstGeom prst="rect">
+            <a:avLst/>
+          </a:prstGeom>
+        </p:spPr>
+      </p:pic>
+      <p:pic>
+        <p:nvPicPr>
+          <p:cNvPr id="13" name="Picture 12">
+            <a:extLst>
+              <a:ext uri="{FF2B5EF4-FFF2-40B4-BE49-F238E27FC236}">
+                <a16:creationId xmlns:a16="http://schemas.microsoft.com/office/drawing/2014/main" id="{3773A1A9-2476-6D45-7881-3AB73BF11A25}"/>
+              </a:ext>
+            </a:extLst>
+          </p:cNvPr>
+          <p:cNvPicPr>
+            <a:picLocks noChangeAspect="1"/>
+          </p:cNvPicPr>
+          <p:nvPr/>
+        </p:nvPicPr>
+        <p:blipFill>
+          <a:blip r:embed="rId6"/>
+          <a:stretch>
+            <a:fillRect/>
+          </a:stretch>
+        </p:blipFill>
+        <p:spPr>
+          <a:xfrm>
+            <a:off x="3669996" y="608765"/>
+            <a:ext cx="6508508" cy="2034898"/>
+          </a:xfrm>
+          <a:prstGeom prst="rect">
+            <a:avLst/>
+          </a:prstGeom>
+        </p:spPr>
+      </p:pic>
+      <p:sp>
+        <p:nvSpPr>
+          <p:cNvPr id="14" name="TextBox 13">
+            <a:extLst>
+              <a:ext uri="{FF2B5EF4-FFF2-40B4-BE49-F238E27FC236}">
+                <a16:creationId xmlns:a16="http://schemas.microsoft.com/office/drawing/2014/main" id="{937E35BF-4629-C166-4C1D-D9D2ADE4F9D7}"/>
+              </a:ext>
+            </a:extLst>
+          </p:cNvPr>
+          <p:cNvSpPr txBox="1"/>
+          <p:nvPr/>
+        </p:nvSpPr>
+        <p:spPr>
+          <a:xfrm>
+            <a:off x="697496" y="270211"/>
+            <a:ext cx="2972500" cy="338554"/>
+          </a:xfrm>
+          <a:prstGeom prst="rect">
+            <a:avLst/>
+          </a:prstGeom>
+          <a:noFill/>
+        </p:spPr>
+        <p:txBody>
+          <a:bodyPr wrap="square">
+            <a:spAutoFit/>
+          </a:bodyPr>
+          <a:lstStyle/>
+          <a:p>
+            <a:r>
+              <a:rPr lang="en-US" sz="1600" b="1" dirty="0">
+                <a:solidFill>
+                  <a:schemeClr val="accent6">
+                    <a:lumMod val="75000"/>
+                  </a:schemeClr>
+                </a:solidFill>
+              </a:rPr>
+              <a:t>Normal state: Take off Holding </a:t>
+            </a:r>
+            <a:endParaRPr lang="en-SG" sz="1600" b="1" dirty="0">
+              <a:solidFill>
+                <a:schemeClr val="accent6">
+                  <a:lumMod val="75000"/>
+                </a:schemeClr>
+              </a:solidFill>
+            </a:endParaRPr>
+          </a:p>
+        </p:txBody>
+      </p:sp>
+      <p:sp>
+        <p:nvSpPr>
+          <p:cNvPr id="15" name="TextBox 14">
+            <a:extLst>
+              <a:ext uri="{FF2B5EF4-FFF2-40B4-BE49-F238E27FC236}">
+                <a16:creationId xmlns:a16="http://schemas.microsoft.com/office/drawing/2014/main" id="{E8583260-B924-D6B2-65EA-4020664F392F}"/>
+              </a:ext>
+            </a:extLst>
+          </p:cNvPr>
+          <p:cNvSpPr txBox="1"/>
+          <p:nvPr/>
+        </p:nvSpPr>
+        <p:spPr>
+          <a:xfrm>
+            <a:off x="696559" y="615998"/>
+            <a:ext cx="2633873" cy="523220"/>
+          </a:xfrm>
+          <a:prstGeom prst="rect">
+            <a:avLst/>
+          </a:prstGeom>
+          <a:noFill/>
+        </p:spPr>
+        <p:txBody>
+          <a:bodyPr wrap="square">
+            <a:spAutoFit/>
+          </a:bodyPr>
+          <a:lstStyle/>
+          <a:p>
+            <a:r>
+              <a:rPr lang="en-US" sz="1400" b="1" dirty="0"/>
+              <a:t>Tower Operator press the holding light on button on HMI</a:t>
+            </a:r>
+            <a:endParaRPr lang="en-SG" sz="1400" b="1" dirty="0"/>
+          </a:p>
+        </p:txBody>
+      </p:sp>
+      <p:cxnSp>
+        <p:nvCxnSpPr>
+          <p:cNvPr id="17" name="Straight Arrow Connector 16">
+            <a:extLst>
+              <a:ext uri="{FF2B5EF4-FFF2-40B4-BE49-F238E27FC236}">
+                <a16:creationId xmlns:a16="http://schemas.microsoft.com/office/drawing/2014/main" id="{7C2FA723-9478-F8E1-336E-2241215D283D}"/>
+              </a:ext>
+            </a:extLst>
+          </p:cNvPr>
+          <p:cNvCxnSpPr>
+            <a:stCxn id="5" idx="3"/>
+          </p:cNvCxnSpPr>
+          <p:nvPr/>
+        </p:nvCxnSpPr>
+        <p:spPr>
+          <a:xfrm flipV="1">
+            <a:off x="3364051" y="1848608"/>
+            <a:ext cx="887909" cy="1"/>
+          </a:xfrm>
+          <a:prstGeom prst="straightConnector1">
+            <a:avLst/>
+          </a:prstGeom>
+          <a:ln w="28575">
+            <a:solidFill>
+              <a:srgbClr val="FF0000"/>
+            </a:solidFill>
+            <a:prstDash val="sysDash"/>
+            <a:tailEnd type="triangle"/>
+          </a:ln>
+        </p:spPr>
+        <p:style>
+          <a:lnRef idx="2">
+            <a:schemeClr val="accent1"/>
+          </a:lnRef>
+          <a:fillRef idx="0">
+            <a:schemeClr val="accent1"/>
+          </a:fillRef>
+          <a:effectRef idx="1">
+            <a:schemeClr val="accent1"/>
+          </a:effectRef>
+          <a:fontRef idx="minor">
+            <a:schemeClr val="tx1"/>
+          </a:fontRef>
+        </p:style>
+      </p:cxnSp>
+      <p:sp>
+        <p:nvSpPr>
+          <p:cNvPr id="18" name="TextBox 17">
+            <a:extLst>
+              <a:ext uri="{FF2B5EF4-FFF2-40B4-BE49-F238E27FC236}">
+                <a16:creationId xmlns:a16="http://schemas.microsoft.com/office/drawing/2014/main" id="{C40DE784-B968-4E16-E5AE-FA2006DFEF18}"/>
+              </a:ext>
+            </a:extLst>
+          </p:cNvPr>
+          <p:cNvSpPr txBox="1"/>
+          <p:nvPr/>
+        </p:nvSpPr>
+        <p:spPr>
+          <a:xfrm>
+            <a:off x="3597693" y="2619084"/>
+            <a:ext cx="4243558" cy="461665"/>
+          </a:xfrm>
+          <a:prstGeom prst="rect">
+            <a:avLst/>
+          </a:prstGeom>
+          <a:noFill/>
+        </p:spPr>
+        <p:txBody>
+          <a:bodyPr wrap="square">
+            <a:spAutoFit/>
+          </a:bodyPr>
+          <a:lstStyle/>
+          <a:p>
+            <a:r>
+              <a:rPr lang="en-US" sz="1200" b="1" dirty="0"/>
+              <a:t>Physical world Take off Holding light turn on and the take off plane wait at the prepare area</a:t>
+            </a:r>
+            <a:endParaRPr lang="en-SG" sz="1200" b="1" dirty="0"/>
+          </a:p>
+        </p:txBody>
+      </p:sp>
+      <p:cxnSp>
+        <p:nvCxnSpPr>
+          <p:cNvPr id="19" name="Straight Arrow Connector 18">
+            <a:extLst>
+              <a:ext uri="{FF2B5EF4-FFF2-40B4-BE49-F238E27FC236}">
+                <a16:creationId xmlns:a16="http://schemas.microsoft.com/office/drawing/2014/main" id="{3100EBEC-EECB-3AE6-AA29-988BBAB8F52B}"/>
+              </a:ext>
+            </a:extLst>
+          </p:cNvPr>
+          <p:cNvCxnSpPr>
+            <a:cxnSpLocks/>
+          </p:cNvCxnSpPr>
+          <p:nvPr/>
+        </p:nvCxnSpPr>
+        <p:spPr>
+          <a:xfrm>
+            <a:off x="8951976" y="1910078"/>
+            <a:ext cx="0" cy="2350369"/>
+          </a:xfrm>
+          <a:prstGeom prst="straightConnector1">
+            <a:avLst/>
+          </a:prstGeom>
+          <a:ln w="28575">
+            <a:solidFill>
+              <a:srgbClr val="FF0000"/>
+            </a:solidFill>
+            <a:prstDash val="sysDash"/>
+            <a:tailEnd type="triangle"/>
+          </a:ln>
+        </p:spPr>
+        <p:style>
+          <a:lnRef idx="2">
+            <a:schemeClr val="accent1"/>
+          </a:lnRef>
+          <a:fillRef idx="0">
+            <a:schemeClr val="accent1"/>
+          </a:fillRef>
+          <a:effectRef idx="1">
+            <a:schemeClr val="accent1"/>
+          </a:effectRef>
+          <a:fontRef idx="minor">
+            <a:schemeClr val="tx1"/>
+          </a:fontRef>
+        </p:style>
+      </p:cxnSp>
+      <p:sp>
+        <p:nvSpPr>
+          <p:cNvPr id="24" name="TextBox 23">
+            <a:extLst>
+              <a:ext uri="{FF2B5EF4-FFF2-40B4-BE49-F238E27FC236}">
+                <a16:creationId xmlns:a16="http://schemas.microsoft.com/office/drawing/2014/main" id="{8176E0B6-A17D-814A-98E1-0F91AC044E8A}"/>
+              </a:ext>
+            </a:extLst>
+          </p:cNvPr>
+          <p:cNvSpPr txBox="1"/>
+          <p:nvPr/>
+        </p:nvSpPr>
+        <p:spPr>
+          <a:xfrm>
+            <a:off x="8951976" y="2641705"/>
+            <a:ext cx="1502815" cy="1015663"/>
+          </a:xfrm>
+          <a:prstGeom prst="rect">
+            <a:avLst/>
+          </a:prstGeom>
+          <a:noFill/>
+        </p:spPr>
+        <p:txBody>
+          <a:bodyPr wrap="square">
+            <a:spAutoFit/>
+          </a:bodyPr>
+          <a:lstStyle/>
+          <a:p>
+            <a:r>
+              <a:rPr lang="en-US" sz="1200" b="1" dirty="0"/>
+              <a:t>Take off light power control indicator shows the current control state is power on</a:t>
+            </a:r>
+            <a:endParaRPr lang="en-SG" sz="1200" b="1" dirty="0"/>
+          </a:p>
+        </p:txBody>
+      </p:sp>
+      <p:cxnSp>
+        <p:nvCxnSpPr>
+          <p:cNvPr id="25" name="Straight Arrow Connector 24">
+            <a:extLst>
+              <a:ext uri="{FF2B5EF4-FFF2-40B4-BE49-F238E27FC236}">
+                <a16:creationId xmlns:a16="http://schemas.microsoft.com/office/drawing/2014/main" id="{72F9F0ED-E97C-9131-0B49-ADC18DA2AFD3}"/>
+              </a:ext>
+            </a:extLst>
+          </p:cNvPr>
+          <p:cNvCxnSpPr>
+            <a:cxnSpLocks/>
+          </p:cNvCxnSpPr>
+          <p:nvPr/>
+        </p:nvCxnSpPr>
+        <p:spPr>
+          <a:xfrm flipH="1" flipV="1">
+            <a:off x="6309360" y="3777252"/>
+            <a:ext cx="1627632" cy="566148"/>
+          </a:xfrm>
+          <a:prstGeom prst="straightConnector1">
+            <a:avLst/>
+          </a:prstGeom>
+          <a:ln w="28575">
+            <a:solidFill>
+              <a:srgbClr val="FF0000"/>
+            </a:solidFill>
+            <a:prstDash val="sysDash"/>
+            <a:tailEnd type="triangle"/>
+          </a:ln>
+        </p:spPr>
+        <p:style>
+          <a:lnRef idx="2">
+            <a:schemeClr val="accent1"/>
+          </a:lnRef>
+          <a:fillRef idx="0">
+            <a:schemeClr val="accent1"/>
+          </a:fillRef>
+          <a:effectRef idx="1">
+            <a:schemeClr val="accent1"/>
+          </a:effectRef>
+          <a:fontRef idx="minor">
+            <a:schemeClr val="tx1"/>
+          </a:fontRef>
+        </p:style>
+      </p:cxnSp>
+      <p:sp>
+        <p:nvSpPr>
+          <p:cNvPr id="30" name="TextBox 29">
+            <a:extLst>
+              <a:ext uri="{FF2B5EF4-FFF2-40B4-BE49-F238E27FC236}">
+                <a16:creationId xmlns:a16="http://schemas.microsoft.com/office/drawing/2014/main" id="{F06D248F-14CB-0D9D-8A75-C9B21F9CF4F9}"/>
+              </a:ext>
+            </a:extLst>
+          </p:cNvPr>
+          <p:cNvSpPr txBox="1"/>
+          <p:nvPr/>
+        </p:nvSpPr>
+        <p:spPr>
+          <a:xfrm>
+            <a:off x="6557881" y="2982217"/>
+            <a:ext cx="2379040" cy="646331"/>
+          </a:xfrm>
+          <a:prstGeom prst="rect">
+            <a:avLst/>
+          </a:prstGeom>
+          <a:noFill/>
+        </p:spPr>
+        <p:txBody>
+          <a:bodyPr wrap="square">
+            <a:spAutoFit/>
+          </a:bodyPr>
+          <a:lstStyle/>
+          <a:p>
+            <a:r>
+              <a:rPr lang="en-US" sz="1200" b="1" dirty="0"/>
+              <a:t>HMI runway state panel take off indicator light up shows PLC report sensor detect light up</a:t>
+            </a:r>
+            <a:endParaRPr lang="en-SG" sz="1200" b="1" dirty="0"/>
+          </a:p>
+        </p:txBody>
+      </p:sp>
+      <p:cxnSp>
+        <p:nvCxnSpPr>
+          <p:cNvPr id="31" name="Straight Arrow Connector 30">
+            <a:extLst>
+              <a:ext uri="{FF2B5EF4-FFF2-40B4-BE49-F238E27FC236}">
+                <a16:creationId xmlns:a16="http://schemas.microsoft.com/office/drawing/2014/main" id="{F09850D0-E8B2-6F4D-E300-1193586ED342}"/>
+              </a:ext>
+            </a:extLst>
+          </p:cNvPr>
+          <p:cNvCxnSpPr>
+            <a:cxnSpLocks/>
+          </p:cNvCxnSpPr>
+          <p:nvPr/>
+        </p:nvCxnSpPr>
+        <p:spPr>
+          <a:xfrm flipH="1">
+            <a:off x="2100146" y="3731532"/>
+            <a:ext cx="889942" cy="0"/>
+          </a:xfrm>
+          <a:prstGeom prst="straightConnector1">
+            <a:avLst/>
+          </a:prstGeom>
+          <a:ln w="28575">
+            <a:solidFill>
+              <a:srgbClr val="FF0000"/>
+            </a:solidFill>
+            <a:prstDash val="sysDash"/>
+            <a:tailEnd type="triangle"/>
+          </a:ln>
+        </p:spPr>
+        <p:style>
+          <a:lnRef idx="2">
+            <a:schemeClr val="accent1"/>
+          </a:lnRef>
+          <a:fillRef idx="0">
+            <a:schemeClr val="accent1"/>
+          </a:fillRef>
+          <a:effectRef idx="1">
+            <a:schemeClr val="accent1"/>
+          </a:effectRef>
+          <a:fontRef idx="minor">
+            <a:schemeClr val="tx1"/>
+          </a:fontRef>
+        </p:style>
+      </p:cxnSp>
+      <p:sp>
+        <p:nvSpPr>
+          <p:cNvPr id="34" name="TextBox 33">
+            <a:extLst>
+              <a:ext uri="{FF2B5EF4-FFF2-40B4-BE49-F238E27FC236}">
+                <a16:creationId xmlns:a16="http://schemas.microsoft.com/office/drawing/2014/main" id="{7F45C92C-A992-6E47-1059-00398D138D14}"/>
+              </a:ext>
+            </a:extLst>
+          </p:cNvPr>
+          <p:cNvSpPr txBox="1"/>
+          <p:nvPr/>
+        </p:nvSpPr>
+        <p:spPr>
+          <a:xfrm>
+            <a:off x="2013495" y="3126468"/>
+            <a:ext cx="889942" cy="1754326"/>
+          </a:xfrm>
+          <a:prstGeom prst="rect">
+            <a:avLst/>
+          </a:prstGeom>
+          <a:noFill/>
+        </p:spPr>
+        <p:txBody>
+          <a:bodyPr wrap="square">
+            <a:spAutoFit/>
+          </a:bodyPr>
+          <a:lstStyle/>
+          <a:p>
+            <a:r>
+              <a:rPr lang="en-US" sz="1200" b="1" dirty="0"/>
+              <a:t>Warning indicator shows there is a plane waiting take off on runway</a:t>
+            </a:r>
+            <a:endParaRPr lang="en-SG" sz="1200" b="1" dirty="0"/>
+          </a:p>
+        </p:txBody>
+      </p:sp>
+    </p:spTree>
+    <p:extLst>
+      <p:ext uri="{BB962C8B-B14F-4D97-AF65-F5344CB8AC3E}">
+        <p14:creationId xmlns:p14="http://schemas.microsoft.com/office/powerpoint/2010/main" val="3540742922"/>
+      </p:ext>
+    </p:extLst>
+  </p:cSld>
+  <p:clrMapOvr>
+    <a:masterClrMapping/>
+  </p:clrMapOvr>
+</p:sld>
+</file>
+
+<file path=ppt/slides/slide6.xml><?xml version="1.0" encoding="utf-8"?>
+<p:sld xmlns:a="http://schemas.openxmlformats.org/drawingml/2006/main" xmlns:r="http://schemas.openxmlformats.org/officeDocument/2006/relationships" xmlns:p="http://schemas.openxmlformats.org/presentationml/2006/main">
+  <p:cSld>
+    <p:spTree>
+      <p:nvGrpSpPr>
+        <p:cNvPr id="1" name=""/>
+        <p:cNvGrpSpPr/>
+        <p:nvPr/>
+      </p:nvGrpSpPr>
+      <p:grpSpPr>
+        <a:xfrm>
+          <a:off x="0" y="0"/>
+          <a:ext cx="0" cy="0"/>
+          <a:chOff x="0" y="0"/>
+          <a:chExt cx="0" cy="0"/>
+        </a:xfrm>
+      </p:grpSpPr>
+      <p:pic>
+        <p:nvPicPr>
+          <p:cNvPr id="5" name="Picture 4">
+            <a:extLst>
+              <a:ext uri="{FF2B5EF4-FFF2-40B4-BE49-F238E27FC236}">
+                <a16:creationId xmlns:a16="http://schemas.microsoft.com/office/drawing/2014/main" id="{A1DA229A-E364-135A-43B1-17EF33159396}"/>
+              </a:ext>
+            </a:extLst>
+          </p:cNvPr>
+          <p:cNvPicPr>
+            <a:picLocks noChangeAspect="1"/>
+          </p:cNvPicPr>
+          <p:nvPr/>
+        </p:nvPicPr>
+        <p:blipFill>
+          <a:blip r:embed="rId2"/>
+          <a:stretch>
+            <a:fillRect/>
+          </a:stretch>
+        </p:blipFill>
+        <p:spPr>
+          <a:xfrm>
+            <a:off x="561943" y="1361642"/>
+            <a:ext cx="3442553" cy="1717998"/>
+          </a:xfrm>
+          <a:prstGeom prst="rect">
+            <a:avLst/>
+          </a:prstGeom>
+          <a:ln w="6350">
+            <a:solidFill>
+              <a:schemeClr val="tx1"/>
+            </a:solidFill>
+          </a:ln>
+        </p:spPr>
+      </p:pic>
+      <p:pic>
+        <p:nvPicPr>
+          <p:cNvPr id="7" name="Picture 6">
+            <a:extLst>
+              <a:ext uri="{FF2B5EF4-FFF2-40B4-BE49-F238E27FC236}">
+                <a16:creationId xmlns:a16="http://schemas.microsoft.com/office/drawing/2014/main" id="{C0BCF944-3B62-5B4D-1043-F68E43BDC07F}"/>
+              </a:ext>
+            </a:extLst>
+          </p:cNvPr>
+          <p:cNvPicPr>
+            <a:picLocks noChangeAspect="1"/>
+          </p:cNvPicPr>
+          <p:nvPr/>
+        </p:nvPicPr>
+        <p:blipFill>
+          <a:blip r:embed="rId3"/>
+          <a:stretch>
+            <a:fillRect/>
+          </a:stretch>
+        </p:blipFill>
+        <p:spPr>
+          <a:xfrm>
+            <a:off x="2496735" y="3673179"/>
+            <a:ext cx="4599009" cy="2248404"/>
+          </a:xfrm>
+          <a:prstGeom prst="rect">
+            <a:avLst/>
+          </a:prstGeom>
+        </p:spPr>
+      </p:pic>
+      <p:pic>
+        <p:nvPicPr>
+          <p:cNvPr id="9" name="Picture 8">
+            <a:extLst>
+              <a:ext uri="{FF2B5EF4-FFF2-40B4-BE49-F238E27FC236}">
+                <a16:creationId xmlns:a16="http://schemas.microsoft.com/office/drawing/2014/main" id="{21804E21-7F7F-9181-E895-671BE785FB66}"/>
+              </a:ext>
+            </a:extLst>
+          </p:cNvPr>
+          <p:cNvPicPr>
+            <a:picLocks noChangeAspect="1"/>
+          </p:cNvPicPr>
+          <p:nvPr/>
+        </p:nvPicPr>
+        <p:blipFill>
+          <a:blip r:embed="rId4"/>
+          <a:srcRect t="19444"/>
+          <a:stretch>
+            <a:fillRect/>
+          </a:stretch>
+        </p:blipFill>
+        <p:spPr>
+          <a:xfrm>
+            <a:off x="384905" y="3778361"/>
+            <a:ext cx="1441622" cy="2094283"/>
+          </a:xfrm>
+          <a:prstGeom prst="rect">
+            <a:avLst/>
+          </a:prstGeom>
+          <a:ln w="9525">
+            <a:solidFill>
+              <a:schemeClr val="tx1"/>
+            </a:solidFill>
+          </a:ln>
+        </p:spPr>
+      </p:pic>
+      <p:pic>
+        <p:nvPicPr>
+          <p:cNvPr id="11" name="Picture 10">
+            <a:extLst>
+              <a:ext uri="{FF2B5EF4-FFF2-40B4-BE49-F238E27FC236}">
+                <a16:creationId xmlns:a16="http://schemas.microsoft.com/office/drawing/2014/main" id="{CB00B178-5F9B-FD65-92D5-4735E864AEA1}"/>
+              </a:ext>
+            </a:extLst>
+          </p:cNvPr>
+          <p:cNvPicPr>
+            <a:picLocks noChangeAspect="1"/>
+          </p:cNvPicPr>
+          <p:nvPr/>
+        </p:nvPicPr>
+        <p:blipFill>
+          <a:blip r:embed="rId5"/>
+          <a:stretch>
+            <a:fillRect/>
+          </a:stretch>
+        </p:blipFill>
+        <p:spPr>
+          <a:xfrm>
+            <a:off x="7609450" y="4201125"/>
+            <a:ext cx="2967603" cy="1720458"/>
+          </a:xfrm>
+          <a:prstGeom prst="rect">
+            <a:avLst/>
+          </a:prstGeom>
+        </p:spPr>
+      </p:pic>
+      <p:pic>
+        <p:nvPicPr>
+          <p:cNvPr id="13" name="Picture 12">
+            <a:extLst>
+              <a:ext uri="{FF2B5EF4-FFF2-40B4-BE49-F238E27FC236}">
+                <a16:creationId xmlns:a16="http://schemas.microsoft.com/office/drawing/2014/main" id="{3B13B8F6-EA8D-D1C1-C585-0815A3546BE0}"/>
+              </a:ext>
+            </a:extLst>
+          </p:cNvPr>
+          <p:cNvPicPr>
+            <a:picLocks noChangeAspect="1"/>
+          </p:cNvPicPr>
+          <p:nvPr/>
+        </p:nvPicPr>
+        <p:blipFill>
+          <a:blip r:embed="rId6"/>
+          <a:srcRect t="13738"/>
+          <a:stretch>
+            <a:fillRect/>
+          </a:stretch>
+        </p:blipFill>
+        <p:spPr>
+          <a:xfrm>
+            <a:off x="4650371" y="936417"/>
+            <a:ext cx="6040611" cy="2193622"/>
+          </a:xfrm>
+          <a:prstGeom prst="rect">
+            <a:avLst/>
+          </a:prstGeom>
+        </p:spPr>
+      </p:pic>
+      <p:sp>
+        <p:nvSpPr>
+          <p:cNvPr id="14" name="TextBox 13">
+            <a:extLst>
+              <a:ext uri="{FF2B5EF4-FFF2-40B4-BE49-F238E27FC236}">
+                <a16:creationId xmlns:a16="http://schemas.microsoft.com/office/drawing/2014/main" id="{3CAFD5E9-8414-5828-BD0E-95BBA2BB5955}"/>
+              </a:ext>
+            </a:extLst>
+          </p:cNvPr>
+          <p:cNvSpPr txBox="1"/>
+          <p:nvPr/>
+        </p:nvSpPr>
+        <p:spPr>
+          <a:xfrm>
+            <a:off x="459956" y="248503"/>
+            <a:ext cx="3941881" cy="338554"/>
+          </a:xfrm>
+          <a:prstGeom prst="rect">
+            <a:avLst/>
+          </a:prstGeom>
+          <a:noFill/>
+        </p:spPr>
+        <p:txBody>
+          <a:bodyPr wrap="square">
+            <a:spAutoFit/>
+          </a:bodyPr>
+          <a:lstStyle/>
+          <a:p>
+            <a:r>
+              <a:rPr lang="en-US" sz="1600" b="1" dirty="0">
+                <a:solidFill>
+                  <a:srgbClr val="C00000"/>
+                </a:solidFill>
+              </a:rPr>
+              <a:t>MITM Attack State: Take off delayed </a:t>
+            </a:r>
+            <a:endParaRPr lang="en-SG" sz="1600" b="1" dirty="0">
+              <a:solidFill>
+                <a:srgbClr val="C00000"/>
+              </a:solidFill>
+            </a:endParaRPr>
+          </a:p>
+        </p:txBody>
+      </p:sp>
+      <p:sp>
+        <p:nvSpPr>
+          <p:cNvPr id="16" name="TextBox 15">
+            <a:extLst>
+              <a:ext uri="{FF2B5EF4-FFF2-40B4-BE49-F238E27FC236}">
+                <a16:creationId xmlns:a16="http://schemas.microsoft.com/office/drawing/2014/main" id="{0AFDC64A-9092-01FC-EDA2-B984E6F596DB}"/>
+              </a:ext>
+            </a:extLst>
+          </p:cNvPr>
+          <p:cNvSpPr txBox="1"/>
+          <p:nvPr/>
+        </p:nvSpPr>
+        <p:spPr>
+          <a:xfrm>
+            <a:off x="413991" y="791635"/>
+            <a:ext cx="3420692" cy="461665"/>
+          </a:xfrm>
+          <a:prstGeom prst="rect">
+            <a:avLst/>
+          </a:prstGeom>
+          <a:noFill/>
+        </p:spPr>
+        <p:txBody>
+          <a:bodyPr wrap="square">
+            <a:spAutoFit/>
+          </a:bodyPr>
+          <a:lstStyle/>
+          <a:p>
+            <a:r>
+              <a:rPr lang="en-US" sz="1200" b="1" dirty="0"/>
+              <a:t>Tower Operator press the holding light off  button on HMI to allow the plane1 take off</a:t>
+            </a:r>
+            <a:endParaRPr lang="en-SG" sz="1200" b="1" dirty="0"/>
+          </a:p>
+        </p:txBody>
+      </p:sp>
+      <p:cxnSp>
+        <p:nvCxnSpPr>
+          <p:cNvPr id="18" name="Straight Arrow Connector 17">
+            <a:extLst>
+              <a:ext uri="{FF2B5EF4-FFF2-40B4-BE49-F238E27FC236}">
+                <a16:creationId xmlns:a16="http://schemas.microsoft.com/office/drawing/2014/main" id="{ED5EDB52-3E2A-453E-97A0-F89302D80962}"/>
+              </a:ext>
+            </a:extLst>
+          </p:cNvPr>
+          <p:cNvCxnSpPr>
+            <a:stCxn id="5" idx="3"/>
+          </p:cNvCxnSpPr>
+          <p:nvPr/>
+        </p:nvCxnSpPr>
+        <p:spPr>
+          <a:xfrm>
+            <a:off x="4004496" y="2220641"/>
+            <a:ext cx="668088" cy="0"/>
+          </a:xfrm>
+          <a:prstGeom prst="straightConnector1">
+            <a:avLst/>
+          </a:prstGeom>
+          <a:ln w="28575">
+            <a:solidFill>
+              <a:srgbClr val="C00000"/>
+            </a:solidFill>
+            <a:prstDash val="sysDash"/>
+            <a:tailEnd type="triangle"/>
+          </a:ln>
+        </p:spPr>
+        <p:style>
+          <a:lnRef idx="2">
+            <a:schemeClr val="accent1"/>
+          </a:lnRef>
+          <a:fillRef idx="0">
+            <a:schemeClr val="accent1"/>
+          </a:fillRef>
+          <a:effectRef idx="1">
+            <a:schemeClr val="accent1"/>
+          </a:effectRef>
+          <a:fontRef idx="minor">
+            <a:schemeClr val="tx1"/>
+          </a:fontRef>
+        </p:style>
+      </p:cxnSp>
+      <p:sp>
+        <p:nvSpPr>
+          <p:cNvPr id="19" name="Multiplication Sign 18">
+            <a:extLst>
+              <a:ext uri="{FF2B5EF4-FFF2-40B4-BE49-F238E27FC236}">
+                <a16:creationId xmlns:a16="http://schemas.microsoft.com/office/drawing/2014/main" id="{9A9D9C71-A2BF-22C8-C016-D5FF1AF4E2CA}"/>
+              </a:ext>
+            </a:extLst>
+          </p:cNvPr>
+          <p:cNvSpPr/>
+          <p:nvPr/>
+        </p:nvSpPr>
+        <p:spPr>
+          <a:xfrm>
+            <a:off x="6877326" y="2085348"/>
+            <a:ext cx="349955" cy="407579"/>
+          </a:xfrm>
+          <a:prstGeom prst="mathMultiply">
+            <a:avLst/>
+          </a:prstGeom>
+          <a:solidFill>
+            <a:srgbClr val="C00000"/>
+          </a:solidFill>
+          <a:ln>
+            <a:solidFill>
+              <a:schemeClr val="bg1"/>
+            </a:solidFill>
+          </a:ln>
+        </p:spPr>
+        <p:style>
+          <a:lnRef idx="2">
+            <a:schemeClr val="accent1">
+              <a:shade val="15000"/>
+            </a:schemeClr>
+          </a:lnRef>
+          <a:fillRef idx="1">
+            <a:schemeClr val="accent1"/>
+          </a:fillRef>
+          <a:effectRef idx="0">
+            <a:schemeClr val="accent1"/>
+          </a:effectRef>
+          <a:fontRef idx="minor">
+            <a:schemeClr val="lt1"/>
+          </a:fontRef>
+        </p:style>
+        <p:txBody>
+          <a:bodyPr rtlCol="0" anchor="ctr"/>
+          <a:lstStyle/>
+          <a:p>
+            <a:pPr algn="ctr"/>
+            <a:endParaRPr lang="en-SG">
+              <a:solidFill>
+                <a:srgbClr val="C00000"/>
+              </a:solidFill>
+            </a:endParaRPr>
+          </a:p>
+        </p:txBody>
+      </p:sp>
+      <p:sp>
+        <p:nvSpPr>
+          <p:cNvPr id="20" name="TextBox 19">
+            <a:extLst>
+              <a:ext uri="{FF2B5EF4-FFF2-40B4-BE49-F238E27FC236}">
+                <a16:creationId xmlns:a16="http://schemas.microsoft.com/office/drawing/2014/main" id="{3461A27B-9C74-AEC2-8536-4003B9AEBE3C}"/>
+              </a:ext>
+            </a:extLst>
+          </p:cNvPr>
+          <p:cNvSpPr txBox="1"/>
+          <p:nvPr/>
+        </p:nvSpPr>
+        <p:spPr>
+          <a:xfrm>
+            <a:off x="4527925" y="306716"/>
+            <a:ext cx="6163051" cy="646331"/>
+          </a:xfrm>
+          <a:prstGeom prst="rect">
+            <a:avLst/>
+          </a:prstGeom>
+          <a:noFill/>
+        </p:spPr>
+        <p:txBody>
+          <a:bodyPr wrap="square">
+            <a:spAutoFit/>
+          </a:bodyPr>
+          <a:lstStyle/>
+          <a:p>
+            <a:r>
+              <a:rPr lang="en-US" sz="1200" b="1" dirty="0">
+                <a:solidFill>
+                  <a:srgbClr val="C00000"/>
+                </a:solidFill>
+              </a:rPr>
+              <a:t>Because of the HMI command data is modified by the MITM attack IoT Camera, the physical world simulation’s holding light is not turned off, plane still waring at the tale off prepare area, physical world generate the warning.</a:t>
+            </a:r>
+            <a:endParaRPr lang="en-SG" sz="1200" b="1" dirty="0">
+              <a:solidFill>
+                <a:srgbClr val="C00000"/>
+              </a:solidFill>
+            </a:endParaRPr>
+          </a:p>
+        </p:txBody>
+      </p:sp>
+      <p:cxnSp>
+        <p:nvCxnSpPr>
+          <p:cNvPr id="22" name="Straight Arrow Connector 21">
+            <a:extLst>
+              <a:ext uri="{FF2B5EF4-FFF2-40B4-BE49-F238E27FC236}">
+                <a16:creationId xmlns:a16="http://schemas.microsoft.com/office/drawing/2014/main" id="{F5290771-395B-17B5-9161-3DA7E7E59EFD}"/>
+              </a:ext>
+            </a:extLst>
+          </p:cNvPr>
+          <p:cNvCxnSpPr>
+            <a:cxnSpLocks/>
+          </p:cNvCxnSpPr>
+          <p:nvPr/>
+        </p:nvCxnSpPr>
+        <p:spPr>
+          <a:xfrm>
+            <a:off x="6967728" y="936417"/>
+            <a:ext cx="0" cy="1148931"/>
+          </a:xfrm>
+          <a:prstGeom prst="straightConnector1">
+            <a:avLst/>
+          </a:prstGeom>
+          <a:ln w="28575">
+            <a:solidFill>
+              <a:srgbClr val="FF0000"/>
+            </a:solidFill>
+            <a:prstDash val="sysDash"/>
+            <a:tailEnd type="triangle"/>
+          </a:ln>
+        </p:spPr>
+        <p:style>
+          <a:lnRef idx="2">
+            <a:schemeClr val="accent1"/>
+          </a:lnRef>
+          <a:fillRef idx="0">
+            <a:schemeClr val="accent1"/>
+          </a:fillRef>
+          <a:effectRef idx="1">
+            <a:schemeClr val="accent1"/>
+          </a:effectRef>
+          <a:fontRef idx="minor">
+            <a:schemeClr val="tx1"/>
+          </a:fontRef>
+        </p:style>
+      </p:cxnSp>
+      <p:sp>
+        <p:nvSpPr>
+          <p:cNvPr id="25" name="Multiplication Sign 24">
+            <a:extLst>
+              <a:ext uri="{FF2B5EF4-FFF2-40B4-BE49-F238E27FC236}">
+                <a16:creationId xmlns:a16="http://schemas.microsoft.com/office/drawing/2014/main" id="{D5F1D5DD-1053-A89E-64ED-65F1A3D4CF2B}"/>
+              </a:ext>
+            </a:extLst>
+          </p:cNvPr>
+          <p:cNvSpPr/>
+          <p:nvPr/>
+        </p:nvSpPr>
+        <p:spPr>
+          <a:xfrm>
+            <a:off x="9144378" y="1881558"/>
+            <a:ext cx="349955" cy="407579"/>
+          </a:xfrm>
+          <a:prstGeom prst="mathMultiply">
+            <a:avLst/>
+          </a:prstGeom>
+          <a:solidFill>
+            <a:srgbClr val="C00000"/>
+          </a:solidFill>
+          <a:ln>
+            <a:solidFill>
+              <a:schemeClr val="bg1"/>
+            </a:solidFill>
+          </a:ln>
+        </p:spPr>
+        <p:style>
+          <a:lnRef idx="2">
+            <a:schemeClr val="accent1">
+              <a:shade val="15000"/>
+            </a:schemeClr>
+          </a:lnRef>
+          <a:fillRef idx="1">
+            <a:schemeClr val="accent1"/>
+          </a:fillRef>
+          <a:effectRef idx="0">
+            <a:schemeClr val="accent1"/>
+          </a:effectRef>
+          <a:fontRef idx="minor">
+            <a:schemeClr val="lt1"/>
+          </a:fontRef>
+        </p:style>
+        <p:txBody>
+          <a:bodyPr rtlCol="0" anchor="ctr"/>
+          <a:lstStyle/>
+          <a:p>
+            <a:pPr algn="ctr"/>
+            <a:endParaRPr lang="en-SG">
+              <a:solidFill>
+                <a:srgbClr val="C00000"/>
+              </a:solidFill>
+            </a:endParaRPr>
+          </a:p>
+        </p:txBody>
+      </p:sp>
+      <p:cxnSp>
+        <p:nvCxnSpPr>
+          <p:cNvPr id="26" name="Straight Arrow Connector 25">
+            <a:extLst>
+              <a:ext uri="{FF2B5EF4-FFF2-40B4-BE49-F238E27FC236}">
+                <a16:creationId xmlns:a16="http://schemas.microsoft.com/office/drawing/2014/main" id="{203201FE-2D97-AB0B-7165-A8F4AC7F86A8}"/>
+              </a:ext>
+            </a:extLst>
+          </p:cNvPr>
+          <p:cNvCxnSpPr>
+            <a:cxnSpLocks/>
+          </p:cNvCxnSpPr>
+          <p:nvPr/>
+        </p:nvCxnSpPr>
+        <p:spPr>
+          <a:xfrm>
+            <a:off x="9319355" y="936417"/>
+            <a:ext cx="0" cy="945141"/>
+          </a:xfrm>
+          <a:prstGeom prst="straightConnector1">
+            <a:avLst/>
+          </a:prstGeom>
+          <a:ln w="28575">
+            <a:solidFill>
+              <a:srgbClr val="FF0000"/>
+            </a:solidFill>
+            <a:prstDash val="sysDash"/>
+            <a:tailEnd type="triangle"/>
+          </a:ln>
+        </p:spPr>
+        <p:style>
+          <a:lnRef idx="2">
+            <a:schemeClr val="accent1"/>
+          </a:lnRef>
+          <a:fillRef idx="0">
+            <a:schemeClr val="accent1"/>
+          </a:fillRef>
+          <a:effectRef idx="1">
+            <a:schemeClr val="accent1"/>
+          </a:effectRef>
+          <a:fontRef idx="minor">
+            <a:schemeClr val="tx1"/>
+          </a:fontRef>
+        </p:style>
+      </p:cxnSp>
+      <p:cxnSp>
+        <p:nvCxnSpPr>
+          <p:cNvPr id="28" name="Straight Arrow Connector 27">
+            <a:extLst>
+              <a:ext uri="{FF2B5EF4-FFF2-40B4-BE49-F238E27FC236}">
+                <a16:creationId xmlns:a16="http://schemas.microsoft.com/office/drawing/2014/main" id="{443E7B5F-DEA3-5957-BDBA-7DBEE08A995A}"/>
+              </a:ext>
+            </a:extLst>
+          </p:cNvPr>
+          <p:cNvCxnSpPr>
+            <a:cxnSpLocks/>
+          </p:cNvCxnSpPr>
+          <p:nvPr/>
+        </p:nvCxnSpPr>
+        <p:spPr>
+          <a:xfrm>
+            <a:off x="5457539" y="889071"/>
+            <a:ext cx="0" cy="208209"/>
+          </a:xfrm>
+          <a:prstGeom prst="straightConnector1">
+            <a:avLst/>
+          </a:prstGeom>
+          <a:ln w="28575">
+            <a:solidFill>
+              <a:srgbClr val="FF0000"/>
+            </a:solidFill>
+            <a:prstDash val="sysDash"/>
+            <a:tailEnd type="triangle"/>
+          </a:ln>
+        </p:spPr>
+        <p:style>
+          <a:lnRef idx="2">
+            <a:schemeClr val="accent1"/>
+          </a:lnRef>
+          <a:fillRef idx="0">
+            <a:schemeClr val="accent1"/>
+          </a:fillRef>
+          <a:effectRef idx="1">
+            <a:schemeClr val="accent1"/>
+          </a:effectRef>
+          <a:fontRef idx="minor">
+            <a:schemeClr val="tx1"/>
+          </a:fontRef>
+        </p:style>
+      </p:cxnSp>
+      <p:cxnSp>
+        <p:nvCxnSpPr>
+          <p:cNvPr id="30" name="Straight Arrow Connector 29">
+            <a:extLst>
+              <a:ext uri="{FF2B5EF4-FFF2-40B4-BE49-F238E27FC236}">
+                <a16:creationId xmlns:a16="http://schemas.microsoft.com/office/drawing/2014/main" id="{6C25CC84-01E3-0DDD-309B-0EB8909BA165}"/>
+              </a:ext>
+            </a:extLst>
+          </p:cNvPr>
+          <p:cNvCxnSpPr>
+            <a:cxnSpLocks/>
+          </p:cNvCxnSpPr>
+          <p:nvPr/>
+        </p:nvCxnSpPr>
+        <p:spPr>
+          <a:xfrm>
+            <a:off x="9433186" y="3160104"/>
+            <a:ext cx="0" cy="2082041"/>
+          </a:xfrm>
+          <a:prstGeom prst="straightConnector1">
+            <a:avLst/>
+          </a:prstGeom>
+          <a:ln w="28575">
+            <a:solidFill>
+              <a:srgbClr val="FF0000"/>
+            </a:solidFill>
+            <a:prstDash val="sysDash"/>
+            <a:tailEnd type="triangle"/>
+          </a:ln>
+        </p:spPr>
+        <p:style>
+          <a:lnRef idx="2">
+            <a:schemeClr val="accent1"/>
+          </a:lnRef>
+          <a:fillRef idx="0">
+            <a:schemeClr val="accent1"/>
+          </a:fillRef>
+          <a:effectRef idx="1">
+            <a:schemeClr val="accent1"/>
+          </a:effectRef>
+          <a:fontRef idx="minor">
+            <a:schemeClr val="tx1"/>
+          </a:fontRef>
+        </p:style>
+      </p:cxnSp>
+      <p:sp>
+        <p:nvSpPr>
+          <p:cNvPr id="32" name="TextBox 31">
+            <a:extLst>
+              <a:ext uri="{FF2B5EF4-FFF2-40B4-BE49-F238E27FC236}">
+                <a16:creationId xmlns:a16="http://schemas.microsoft.com/office/drawing/2014/main" id="{5DD3E2E3-BDA4-7F65-90B0-894ECABB06B5}"/>
+              </a:ext>
+            </a:extLst>
+          </p:cNvPr>
+          <p:cNvSpPr txBox="1"/>
+          <p:nvPr/>
+        </p:nvSpPr>
+        <p:spPr>
+          <a:xfrm>
+            <a:off x="9433186" y="3185461"/>
+            <a:ext cx="1809151" cy="1015663"/>
+          </a:xfrm>
+          <a:prstGeom prst="rect">
+            <a:avLst/>
+          </a:prstGeom>
+          <a:noFill/>
+        </p:spPr>
+        <p:txBody>
+          <a:bodyPr wrap="square">
+            <a:spAutoFit/>
+          </a:bodyPr>
+          <a:lstStyle/>
+          <a:p>
+            <a:r>
+              <a:rPr lang="en-US" sz="1200" b="1" dirty="0">
+                <a:solidFill>
+                  <a:srgbClr val="C00000"/>
+                </a:solidFill>
+              </a:rPr>
+              <a:t>MITM modify the control action confirm message, the power panel shows the power control is power off </a:t>
+            </a:r>
+            <a:endParaRPr lang="en-SG" sz="1200" b="1" dirty="0">
+              <a:solidFill>
+                <a:srgbClr val="C00000"/>
+              </a:solidFill>
+            </a:endParaRPr>
+          </a:p>
+        </p:txBody>
+      </p:sp>
+      <p:cxnSp>
+        <p:nvCxnSpPr>
+          <p:cNvPr id="33" name="Straight Arrow Connector 32">
+            <a:extLst>
+              <a:ext uri="{FF2B5EF4-FFF2-40B4-BE49-F238E27FC236}">
+                <a16:creationId xmlns:a16="http://schemas.microsoft.com/office/drawing/2014/main" id="{4E50DAD4-5FB3-1F52-2941-8F97D077952C}"/>
+              </a:ext>
+            </a:extLst>
+          </p:cNvPr>
+          <p:cNvCxnSpPr>
+            <a:cxnSpLocks/>
+          </p:cNvCxnSpPr>
+          <p:nvPr/>
+        </p:nvCxnSpPr>
+        <p:spPr>
+          <a:xfrm flipH="1" flipV="1">
+            <a:off x="5806440" y="4910328"/>
+            <a:ext cx="2551176" cy="466344"/>
+          </a:xfrm>
+          <a:prstGeom prst="straightConnector1">
+            <a:avLst/>
+          </a:prstGeom>
+          <a:ln w="28575">
+            <a:solidFill>
+              <a:srgbClr val="FF0000"/>
+            </a:solidFill>
+            <a:prstDash val="sysDash"/>
+            <a:tailEnd type="triangle"/>
+          </a:ln>
+        </p:spPr>
+        <p:style>
+          <a:lnRef idx="2">
+            <a:schemeClr val="accent1"/>
+          </a:lnRef>
+          <a:fillRef idx="0">
+            <a:schemeClr val="accent1"/>
+          </a:fillRef>
+          <a:effectRef idx="1">
+            <a:schemeClr val="accent1"/>
+          </a:effectRef>
+          <a:fontRef idx="minor">
+            <a:schemeClr val="tx1"/>
+          </a:fontRef>
+        </p:style>
+      </p:cxnSp>
+      <p:sp>
+        <p:nvSpPr>
+          <p:cNvPr id="37" name="TextBox 36">
+            <a:extLst>
+              <a:ext uri="{FF2B5EF4-FFF2-40B4-BE49-F238E27FC236}">
+                <a16:creationId xmlns:a16="http://schemas.microsoft.com/office/drawing/2014/main" id="{164BE537-90E6-F091-1408-22F8194A8B51}"/>
+              </a:ext>
+            </a:extLst>
+          </p:cNvPr>
+          <p:cNvSpPr txBox="1"/>
+          <p:nvPr/>
+        </p:nvSpPr>
+        <p:spPr>
+          <a:xfrm>
+            <a:off x="3387557" y="3231627"/>
+            <a:ext cx="5642597" cy="461665"/>
+          </a:xfrm>
+          <a:prstGeom prst="rect">
+            <a:avLst/>
+          </a:prstGeom>
+          <a:noFill/>
+        </p:spPr>
+        <p:txBody>
+          <a:bodyPr wrap="square">
+            <a:spAutoFit/>
+          </a:bodyPr>
+          <a:lstStyle/>
+          <a:p>
+            <a:r>
+              <a:rPr lang="en-US" sz="1200" b="1" dirty="0">
+                <a:solidFill>
+                  <a:srgbClr val="C00000"/>
+                </a:solidFill>
+              </a:rPr>
+              <a:t>MITM attack reverse the take off light sensor feed back value HMI runway state panel take off indicator light up shows PLC report sensor detect light off</a:t>
+            </a:r>
+            <a:endParaRPr lang="en-SG" sz="1200" b="1" dirty="0">
+              <a:solidFill>
+                <a:srgbClr val="C00000"/>
+              </a:solidFill>
+            </a:endParaRPr>
+          </a:p>
+        </p:txBody>
+      </p:sp>
+      <p:cxnSp>
+        <p:nvCxnSpPr>
+          <p:cNvPr id="38" name="Straight Arrow Connector 37">
+            <a:extLst>
+              <a:ext uri="{FF2B5EF4-FFF2-40B4-BE49-F238E27FC236}">
+                <a16:creationId xmlns:a16="http://schemas.microsoft.com/office/drawing/2014/main" id="{2261A943-F559-2E45-C12D-9D57D09CAE68}"/>
+              </a:ext>
+            </a:extLst>
+          </p:cNvPr>
+          <p:cNvCxnSpPr>
+            <a:cxnSpLocks/>
+          </p:cNvCxnSpPr>
+          <p:nvPr/>
+        </p:nvCxnSpPr>
+        <p:spPr>
+          <a:xfrm flipH="1">
+            <a:off x="1240561" y="5703606"/>
+            <a:ext cx="1306776" cy="0"/>
+          </a:xfrm>
+          <a:prstGeom prst="straightConnector1">
+            <a:avLst/>
+          </a:prstGeom>
+          <a:ln w="28575">
+            <a:solidFill>
+              <a:srgbClr val="FF0000"/>
+            </a:solidFill>
+            <a:prstDash val="sysDash"/>
+            <a:tailEnd type="triangle"/>
+          </a:ln>
+        </p:spPr>
+        <p:style>
+          <a:lnRef idx="2">
+            <a:schemeClr val="accent1"/>
+          </a:lnRef>
+          <a:fillRef idx="0">
+            <a:schemeClr val="accent1"/>
+          </a:fillRef>
+          <a:effectRef idx="1">
+            <a:schemeClr val="accent1"/>
+          </a:effectRef>
+          <a:fontRef idx="minor">
+            <a:schemeClr val="tx1"/>
+          </a:fontRef>
+        </p:style>
+      </p:cxnSp>
+      <p:sp>
+        <p:nvSpPr>
+          <p:cNvPr id="41" name="TextBox 40">
+            <a:extLst>
+              <a:ext uri="{FF2B5EF4-FFF2-40B4-BE49-F238E27FC236}">
+                <a16:creationId xmlns:a16="http://schemas.microsoft.com/office/drawing/2014/main" id="{CEF84942-30E9-3B7C-626E-40C6A5A3E267}"/>
+              </a:ext>
+            </a:extLst>
+          </p:cNvPr>
+          <p:cNvSpPr txBox="1"/>
+          <p:nvPr/>
+        </p:nvSpPr>
+        <p:spPr>
+          <a:xfrm>
+            <a:off x="334342" y="3250759"/>
+            <a:ext cx="2851699" cy="461665"/>
+          </a:xfrm>
+          <a:prstGeom prst="rect">
+            <a:avLst/>
+          </a:prstGeom>
+          <a:noFill/>
+        </p:spPr>
+        <p:txBody>
+          <a:bodyPr wrap="square">
+            <a:spAutoFit/>
+          </a:bodyPr>
+          <a:lstStyle/>
+          <a:p>
+            <a:r>
+              <a:rPr lang="en-US" sz="1200" b="1" dirty="0">
+                <a:solidFill>
+                  <a:srgbClr val="C00000"/>
+                </a:solidFill>
+              </a:rPr>
+              <a:t>The take off warning is also not shown in the HMI warning indicator panel</a:t>
+            </a:r>
+            <a:endParaRPr lang="en-SG" sz="1200" b="1" dirty="0">
+              <a:solidFill>
+                <a:srgbClr val="C00000"/>
+              </a:solidFill>
+            </a:endParaRPr>
+          </a:p>
+        </p:txBody>
+      </p:sp>
+      <p:sp>
+        <p:nvSpPr>
+          <p:cNvPr id="42" name="Multiplication Sign 41">
+            <a:extLst>
+              <a:ext uri="{FF2B5EF4-FFF2-40B4-BE49-F238E27FC236}">
+                <a16:creationId xmlns:a16="http://schemas.microsoft.com/office/drawing/2014/main" id="{E76E8ADB-04BA-CB47-AC5B-7A47E3B9C3CC}"/>
+              </a:ext>
+            </a:extLst>
+          </p:cNvPr>
+          <p:cNvSpPr/>
+          <p:nvPr/>
+        </p:nvSpPr>
+        <p:spPr>
+          <a:xfrm>
+            <a:off x="9117379" y="5172882"/>
+            <a:ext cx="349955" cy="407579"/>
+          </a:xfrm>
+          <a:prstGeom prst="mathMultiply">
+            <a:avLst/>
+          </a:prstGeom>
+          <a:solidFill>
+            <a:srgbClr val="C00000"/>
+          </a:solidFill>
+          <a:ln>
+            <a:solidFill>
+              <a:schemeClr val="bg1"/>
+            </a:solidFill>
+          </a:ln>
+        </p:spPr>
+        <p:style>
+          <a:lnRef idx="2">
+            <a:schemeClr val="accent1">
+              <a:shade val="15000"/>
+            </a:schemeClr>
+          </a:lnRef>
+          <a:fillRef idx="1">
+            <a:schemeClr val="accent1"/>
+          </a:fillRef>
+          <a:effectRef idx="0">
+            <a:schemeClr val="accent1"/>
+          </a:effectRef>
+          <a:fontRef idx="minor">
+            <a:schemeClr val="lt1"/>
+          </a:fontRef>
+        </p:style>
+        <p:txBody>
+          <a:bodyPr rtlCol="0" anchor="ctr"/>
+          <a:lstStyle/>
+          <a:p>
+            <a:pPr algn="ctr"/>
+            <a:endParaRPr lang="en-SG">
+              <a:solidFill>
+                <a:srgbClr val="C00000"/>
+              </a:solidFill>
+            </a:endParaRPr>
+          </a:p>
+        </p:txBody>
+      </p:sp>
+      <p:sp>
+        <p:nvSpPr>
+          <p:cNvPr id="43" name="Multiplication Sign 42">
+            <a:extLst>
+              <a:ext uri="{FF2B5EF4-FFF2-40B4-BE49-F238E27FC236}">
+                <a16:creationId xmlns:a16="http://schemas.microsoft.com/office/drawing/2014/main" id="{4CA4B01A-8A02-AC5A-AC2F-2B7E36C000C6}"/>
+              </a:ext>
+            </a:extLst>
+          </p:cNvPr>
+          <p:cNvSpPr/>
+          <p:nvPr/>
+        </p:nvSpPr>
+        <p:spPr>
+          <a:xfrm>
+            <a:off x="5254969" y="4621712"/>
+            <a:ext cx="349955" cy="407579"/>
+          </a:xfrm>
+          <a:prstGeom prst="mathMultiply">
+            <a:avLst/>
+          </a:prstGeom>
+          <a:solidFill>
+            <a:srgbClr val="C00000"/>
+          </a:solidFill>
+          <a:ln>
+            <a:solidFill>
+              <a:schemeClr val="bg1"/>
+            </a:solidFill>
+          </a:ln>
+        </p:spPr>
+        <p:style>
+          <a:lnRef idx="2">
+            <a:schemeClr val="accent1">
+              <a:shade val="15000"/>
+            </a:schemeClr>
+          </a:lnRef>
+          <a:fillRef idx="1">
+            <a:schemeClr val="accent1"/>
+          </a:fillRef>
+          <a:effectRef idx="0">
+            <a:schemeClr val="accent1"/>
+          </a:effectRef>
+          <a:fontRef idx="minor">
+            <a:schemeClr val="lt1"/>
+          </a:fontRef>
+        </p:style>
+        <p:txBody>
+          <a:bodyPr rtlCol="0" anchor="ctr"/>
+          <a:lstStyle/>
+          <a:p>
+            <a:pPr algn="ctr"/>
+            <a:endParaRPr lang="en-SG">
+              <a:solidFill>
+                <a:srgbClr val="C00000"/>
+              </a:solidFill>
+            </a:endParaRPr>
+          </a:p>
+        </p:txBody>
+      </p:sp>
+      <p:sp>
+        <p:nvSpPr>
+          <p:cNvPr id="44" name="Multiplication Sign 43">
+            <a:extLst>
+              <a:ext uri="{FF2B5EF4-FFF2-40B4-BE49-F238E27FC236}">
+                <a16:creationId xmlns:a16="http://schemas.microsoft.com/office/drawing/2014/main" id="{B3BDBD80-8239-CA97-5EEA-3BDA250E5FC8}"/>
+              </a:ext>
+            </a:extLst>
+          </p:cNvPr>
+          <p:cNvSpPr/>
+          <p:nvPr/>
+        </p:nvSpPr>
+        <p:spPr>
+          <a:xfrm>
+            <a:off x="890606" y="5531002"/>
+            <a:ext cx="349955" cy="407579"/>
+          </a:xfrm>
+          <a:prstGeom prst="mathMultiply">
+            <a:avLst/>
+          </a:prstGeom>
+          <a:solidFill>
+            <a:srgbClr val="C00000"/>
+          </a:solidFill>
+          <a:ln>
+            <a:solidFill>
+              <a:schemeClr val="bg1"/>
+            </a:solidFill>
+          </a:ln>
+        </p:spPr>
+        <p:style>
+          <a:lnRef idx="2">
+            <a:schemeClr val="accent1">
+              <a:shade val="15000"/>
+            </a:schemeClr>
+          </a:lnRef>
+          <a:fillRef idx="1">
+            <a:schemeClr val="accent1"/>
+          </a:fillRef>
+          <a:effectRef idx="0">
+            <a:schemeClr val="accent1"/>
+          </a:effectRef>
+          <a:fontRef idx="minor">
+            <a:schemeClr val="lt1"/>
+          </a:fontRef>
+        </p:style>
+        <p:txBody>
+          <a:bodyPr rtlCol="0" anchor="ctr"/>
+          <a:lstStyle/>
+          <a:p>
+            <a:pPr algn="ctr"/>
+            <a:endParaRPr lang="en-SG">
+              <a:solidFill>
+                <a:srgbClr val="C00000"/>
+              </a:solidFill>
+            </a:endParaRPr>
+          </a:p>
+        </p:txBody>
+      </p:sp>
+    </p:spTree>
+    <p:extLst>
+      <p:ext uri="{BB962C8B-B14F-4D97-AF65-F5344CB8AC3E}">
+        <p14:creationId xmlns:p14="http://schemas.microsoft.com/office/powerpoint/2010/main" val="4241073122"/>
       </p:ext>
     </p:extLst>
   </p:cSld>

</xml_diff>